<commit_message>
Updated content for blog
</commit_message>
<xml_diff>
--- a/HTTP2 Server Push/logo template.pptx
+++ b/HTTP2 Server Push/logo template.pptx
@@ -6,6 +6,8 @@
   </p:sldMasterIdLst>
   <p:sldIdLst>
     <p:sldId id="256" r:id="rId2"/>
+    <p:sldId id="257" r:id="rId3"/>
+    <p:sldId id="258" r:id="rId4"/>
   </p:sldIdLst>
   <p:sldSz cx="12192000" cy="6858000"/>
   <p:notesSz cx="6858000" cy="9144000"/>
@@ -104,6 +106,11 @@
       </a:defRPr>
     </a:lvl9pPr>
   </p:defaultTextStyle>
+  <p:extLst>
+    <p:ext uri="{EFAFB233-063F-42B5-8137-9DF3F51BA10A}">
+      <p15:sldGuideLst xmlns:p15="http://schemas.microsoft.com/office/powerpoint/2012/main"/>
+    </p:ext>
+  </p:extLst>
 </p:presentation>
 </file>
 
@@ -3925,6 +3932,2808 @@
 </p:sld>
 </file>
 
+<file path=ppt/slides/slide2.xml><?xml version="1.0" encoding="utf-8"?>
+<p:sld xmlns:a="http://schemas.openxmlformats.org/drawingml/2006/main" xmlns:r="http://schemas.openxmlformats.org/officeDocument/2006/relationships" xmlns:p="http://schemas.openxmlformats.org/presentationml/2006/main">
+  <p:cSld>
+    <p:spTree>
+      <p:nvGrpSpPr>
+        <p:cNvPr id="1" name=""/>
+        <p:cNvGrpSpPr/>
+        <p:nvPr/>
+      </p:nvGrpSpPr>
+      <p:grpSpPr>
+        <a:xfrm>
+          <a:off x="0" y="0"/>
+          <a:ext cx="0" cy="0"/>
+          <a:chOff x="0" y="0"/>
+          <a:chExt cx="0" cy="0"/>
+        </a:xfrm>
+      </p:grpSpPr>
+      <p:pic>
+        <p:nvPicPr>
+          <p:cNvPr id="4" name="Picture 3">
+            <a:extLst>
+              <a:ext uri="{FF2B5EF4-FFF2-40B4-BE49-F238E27FC236}">
+                <a16:creationId xmlns:a16="http://schemas.microsoft.com/office/drawing/2014/main" id="{2E44B04D-E0E1-4761-9E3F-D54473366348}"/>
+              </a:ext>
+            </a:extLst>
+          </p:cNvPr>
+          <p:cNvPicPr>
+            <a:picLocks noChangeAspect="1"/>
+          </p:cNvPicPr>
+          <p:nvPr/>
+        </p:nvPicPr>
+        <p:blipFill>
+          <a:blip r:embed="rId2">
+            <a:extLst>
+              <a:ext uri="{28A0092B-C50C-407E-A947-70E740481C1C}">
+                <a14:useLocalDpi xmlns:a14="http://schemas.microsoft.com/office/drawing/2010/main" val="0"/>
+              </a:ext>
+            </a:extLst>
+          </a:blip>
+          <a:stretch>
+            <a:fillRect/>
+          </a:stretch>
+        </p:blipFill>
+        <p:spPr>
+          <a:xfrm>
+            <a:off x="9439352" y="2702605"/>
+            <a:ext cx="1191533" cy="1191533"/>
+          </a:xfrm>
+          <a:prstGeom prst="rect">
+            <a:avLst/>
+          </a:prstGeom>
+        </p:spPr>
+      </p:pic>
+      <p:pic>
+        <p:nvPicPr>
+          <p:cNvPr id="1026" name="Picture 2" descr="Image result for web server image">
+            <a:extLst>
+              <a:ext uri="{FF2B5EF4-FFF2-40B4-BE49-F238E27FC236}">
+                <a16:creationId xmlns:a16="http://schemas.microsoft.com/office/drawing/2014/main" id="{D181345F-3F9F-4DA0-AD9C-0B4B671040F8}"/>
+              </a:ext>
+            </a:extLst>
+          </p:cNvPr>
+          <p:cNvPicPr>
+            <a:picLocks noChangeAspect="1" noChangeArrowheads="1"/>
+          </p:cNvPicPr>
+          <p:nvPr/>
+        </p:nvPicPr>
+        <p:blipFill>
+          <a:blip r:embed="rId3">
+            <a:grayscl/>
+            <a:extLst>
+              <a:ext uri="{28A0092B-C50C-407E-A947-70E740481C1C}">
+                <a14:useLocalDpi xmlns:a14="http://schemas.microsoft.com/office/drawing/2010/main" val="0"/>
+              </a:ext>
+            </a:extLst>
+          </a:blip>
+          <a:srcRect/>
+          <a:stretch>
+            <a:fillRect/>
+          </a:stretch>
+        </p:blipFill>
+        <p:spPr bwMode="auto">
+          <a:xfrm>
+            <a:off x="584590" y="2570535"/>
+            <a:ext cx="2289238" cy="1716929"/>
+          </a:xfrm>
+          <a:prstGeom prst="rect">
+            <a:avLst/>
+          </a:prstGeom>
+          <a:noFill/>
+          <a:extLst>
+            <a:ext uri="{909E8E84-426E-40DD-AFC4-6F175D3DCCD1}">
+              <a14:hiddenFill xmlns:a14="http://schemas.microsoft.com/office/drawing/2010/main">
+                <a:solidFill>
+                  <a:srgbClr val="FFFFFF"/>
+                </a:solidFill>
+              </a14:hiddenFill>
+            </a:ext>
+          </a:extLst>
+        </p:spPr>
+      </p:pic>
+      <p:sp>
+        <p:nvSpPr>
+          <p:cNvPr id="6" name="Subtitle 2">
+            <a:extLst>
+              <a:ext uri="{FF2B5EF4-FFF2-40B4-BE49-F238E27FC236}">
+                <a16:creationId xmlns:a16="http://schemas.microsoft.com/office/drawing/2014/main" id="{AD7E004A-5E1D-4B05-841D-53D00E03AAAA}"/>
+              </a:ext>
+            </a:extLst>
+          </p:cNvPr>
+          <p:cNvSpPr txBox="1">
+            <a:spLocks/>
+          </p:cNvSpPr>
+          <p:nvPr/>
+        </p:nvSpPr>
+        <p:spPr>
+          <a:xfrm>
+            <a:off x="486626" y="2024744"/>
+            <a:ext cx="2723106" cy="545791"/>
+          </a:xfrm>
+          <a:prstGeom prst="rect">
+            <a:avLst/>
+          </a:prstGeom>
+        </p:spPr>
+        <p:txBody>
+          <a:bodyPr vert="horz" lIns="91440" tIns="45720" rIns="91440" bIns="45720" rtlCol="0">
+            <a:normAutofit fontScale="55000" lnSpcReduction="20000"/>
+          </a:bodyPr>
+          <a:lstStyle>
+            <a:lvl1pPr marL="0" indent="0" algn="ctr" defTabSz="914400" rtl="0" eaLnBrk="1" latinLnBrk="0" hangingPunct="1">
+              <a:lnSpc>
+                <a:spcPct val="90000"/>
+              </a:lnSpc>
+              <a:spcBef>
+                <a:spcPts val="1000"/>
+              </a:spcBef>
+              <a:buFont typeface="Arial" panose="020B0604020202020204" pitchFamily="34" charset="0"/>
+              <a:buNone/>
+              <a:defRPr sz="2400" kern="1200">
+                <a:solidFill>
+                  <a:schemeClr val="tx1"/>
+                </a:solidFill>
+                <a:latin typeface="+mn-lt"/>
+                <a:ea typeface="+mn-ea"/>
+                <a:cs typeface="+mn-cs"/>
+              </a:defRPr>
+            </a:lvl1pPr>
+            <a:lvl2pPr marL="457200" indent="0" algn="ctr" defTabSz="914400" rtl="0" eaLnBrk="1" latinLnBrk="0" hangingPunct="1">
+              <a:lnSpc>
+                <a:spcPct val="90000"/>
+              </a:lnSpc>
+              <a:spcBef>
+                <a:spcPts val="500"/>
+              </a:spcBef>
+              <a:buFont typeface="Arial" panose="020B0604020202020204" pitchFamily="34" charset="0"/>
+              <a:buNone/>
+              <a:defRPr sz="2000" kern="1200">
+                <a:solidFill>
+                  <a:schemeClr val="tx1"/>
+                </a:solidFill>
+                <a:latin typeface="+mn-lt"/>
+                <a:ea typeface="+mn-ea"/>
+                <a:cs typeface="+mn-cs"/>
+              </a:defRPr>
+            </a:lvl2pPr>
+            <a:lvl3pPr marL="914400" indent="0" algn="ctr" defTabSz="914400" rtl="0" eaLnBrk="1" latinLnBrk="0" hangingPunct="1">
+              <a:lnSpc>
+                <a:spcPct val="90000"/>
+              </a:lnSpc>
+              <a:spcBef>
+                <a:spcPts val="500"/>
+              </a:spcBef>
+              <a:buFont typeface="Arial" panose="020B0604020202020204" pitchFamily="34" charset="0"/>
+              <a:buNone/>
+              <a:defRPr sz="1800" kern="1200">
+                <a:solidFill>
+                  <a:schemeClr val="tx1"/>
+                </a:solidFill>
+                <a:latin typeface="+mn-lt"/>
+                <a:ea typeface="+mn-ea"/>
+                <a:cs typeface="+mn-cs"/>
+              </a:defRPr>
+            </a:lvl3pPr>
+            <a:lvl4pPr marL="1371600" indent="0" algn="ctr" defTabSz="914400" rtl="0" eaLnBrk="1" latinLnBrk="0" hangingPunct="1">
+              <a:lnSpc>
+                <a:spcPct val="90000"/>
+              </a:lnSpc>
+              <a:spcBef>
+                <a:spcPts val="500"/>
+              </a:spcBef>
+              <a:buFont typeface="Arial" panose="020B0604020202020204" pitchFamily="34" charset="0"/>
+              <a:buNone/>
+              <a:defRPr sz="1600" kern="1200">
+                <a:solidFill>
+                  <a:schemeClr val="tx1"/>
+                </a:solidFill>
+                <a:latin typeface="+mn-lt"/>
+                <a:ea typeface="+mn-ea"/>
+                <a:cs typeface="+mn-cs"/>
+              </a:defRPr>
+            </a:lvl4pPr>
+            <a:lvl5pPr marL="1828800" indent="0" algn="ctr" defTabSz="914400" rtl="0" eaLnBrk="1" latinLnBrk="0" hangingPunct="1">
+              <a:lnSpc>
+                <a:spcPct val="90000"/>
+              </a:lnSpc>
+              <a:spcBef>
+                <a:spcPts val="500"/>
+              </a:spcBef>
+              <a:buFont typeface="Arial" panose="020B0604020202020204" pitchFamily="34" charset="0"/>
+              <a:buNone/>
+              <a:defRPr sz="1600" kern="1200">
+                <a:solidFill>
+                  <a:schemeClr val="tx1"/>
+                </a:solidFill>
+                <a:latin typeface="+mn-lt"/>
+                <a:ea typeface="+mn-ea"/>
+                <a:cs typeface="+mn-cs"/>
+              </a:defRPr>
+            </a:lvl5pPr>
+            <a:lvl6pPr marL="2286000" indent="0" algn="ctr" defTabSz="914400" rtl="0" eaLnBrk="1" latinLnBrk="0" hangingPunct="1">
+              <a:lnSpc>
+                <a:spcPct val="90000"/>
+              </a:lnSpc>
+              <a:spcBef>
+                <a:spcPts val="500"/>
+              </a:spcBef>
+              <a:buFont typeface="Arial" panose="020B0604020202020204" pitchFamily="34" charset="0"/>
+              <a:buNone/>
+              <a:defRPr sz="1600" kern="1200">
+                <a:solidFill>
+                  <a:schemeClr val="tx1"/>
+                </a:solidFill>
+                <a:latin typeface="+mn-lt"/>
+                <a:ea typeface="+mn-ea"/>
+                <a:cs typeface="+mn-cs"/>
+              </a:defRPr>
+            </a:lvl6pPr>
+            <a:lvl7pPr marL="2743200" indent="0" algn="ctr" defTabSz="914400" rtl="0" eaLnBrk="1" latinLnBrk="0" hangingPunct="1">
+              <a:lnSpc>
+                <a:spcPct val="90000"/>
+              </a:lnSpc>
+              <a:spcBef>
+                <a:spcPts val="500"/>
+              </a:spcBef>
+              <a:buFont typeface="Arial" panose="020B0604020202020204" pitchFamily="34" charset="0"/>
+              <a:buNone/>
+              <a:defRPr sz="1600" kern="1200">
+                <a:solidFill>
+                  <a:schemeClr val="tx1"/>
+                </a:solidFill>
+                <a:latin typeface="+mn-lt"/>
+                <a:ea typeface="+mn-ea"/>
+                <a:cs typeface="+mn-cs"/>
+              </a:defRPr>
+            </a:lvl7pPr>
+            <a:lvl8pPr marL="3200400" indent="0" algn="ctr" defTabSz="914400" rtl="0" eaLnBrk="1" latinLnBrk="0" hangingPunct="1">
+              <a:lnSpc>
+                <a:spcPct val="90000"/>
+              </a:lnSpc>
+              <a:spcBef>
+                <a:spcPts val="500"/>
+              </a:spcBef>
+              <a:buFont typeface="Arial" panose="020B0604020202020204" pitchFamily="34" charset="0"/>
+              <a:buNone/>
+              <a:defRPr sz="1600" kern="1200">
+                <a:solidFill>
+                  <a:schemeClr val="tx1"/>
+                </a:solidFill>
+                <a:latin typeface="+mn-lt"/>
+                <a:ea typeface="+mn-ea"/>
+                <a:cs typeface="+mn-cs"/>
+              </a:defRPr>
+            </a:lvl8pPr>
+            <a:lvl9pPr marL="3657600" indent="0" algn="ctr" defTabSz="914400" rtl="0" eaLnBrk="1" latinLnBrk="0" hangingPunct="1">
+              <a:lnSpc>
+                <a:spcPct val="90000"/>
+              </a:lnSpc>
+              <a:spcBef>
+                <a:spcPts val="500"/>
+              </a:spcBef>
+              <a:buFont typeface="Arial" panose="020B0604020202020204" pitchFamily="34" charset="0"/>
+              <a:buNone/>
+              <a:defRPr sz="1600" kern="1200">
+                <a:solidFill>
+                  <a:schemeClr val="tx1"/>
+                </a:solidFill>
+                <a:latin typeface="+mn-lt"/>
+                <a:ea typeface="+mn-ea"/>
+                <a:cs typeface="+mn-cs"/>
+              </a:defRPr>
+            </a:lvl9pPr>
+          </a:lstStyle>
+          <a:p>
+            <a:pPr algn="l"/>
+            <a:r>
+              <a:rPr lang="en-US" sz="7200" dirty="0">
+                <a:solidFill>
+                  <a:srgbClr val="00B0F0"/>
+                </a:solidFill>
+                <a:latin typeface="Segoe UI Light" panose="020B0502040204020203" pitchFamily="34" charset="0"/>
+                <a:cs typeface="Segoe UI Light" panose="020B0502040204020203" pitchFamily="34" charset="0"/>
+              </a:rPr>
+              <a:t>Web Server</a:t>
+            </a:r>
+          </a:p>
+        </p:txBody>
+      </p:sp>
+      <p:sp>
+        <p:nvSpPr>
+          <p:cNvPr id="7" name="Subtitle 2">
+            <a:extLst>
+              <a:ext uri="{FF2B5EF4-FFF2-40B4-BE49-F238E27FC236}">
+                <a16:creationId xmlns:a16="http://schemas.microsoft.com/office/drawing/2014/main" id="{0B68BF50-6401-42DC-9401-6ABB540721CB}"/>
+              </a:ext>
+            </a:extLst>
+          </p:cNvPr>
+          <p:cNvSpPr txBox="1">
+            <a:spLocks/>
+          </p:cNvSpPr>
+          <p:nvPr/>
+        </p:nvSpPr>
+        <p:spPr>
+          <a:xfrm>
+            <a:off x="8982270" y="1924641"/>
+            <a:ext cx="2105698" cy="645894"/>
+          </a:xfrm>
+          <a:prstGeom prst="rect">
+            <a:avLst/>
+          </a:prstGeom>
+        </p:spPr>
+        <p:txBody>
+          <a:bodyPr vert="horz" lIns="91440" tIns="45720" rIns="91440" bIns="45720" rtlCol="0">
+            <a:noAutofit/>
+          </a:bodyPr>
+          <a:lstStyle>
+            <a:lvl1pPr marL="228600" indent="-228600" algn="l" defTabSz="914400" rtl="0" eaLnBrk="1" latinLnBrk="0" hangingPunct="1">
+              <a:lnSpc>
+                <a:spcPct val="90000"/>
+              </a:lnSpc>
+              <a:spcBef>
+                <a:spcPts val="1000"/>
+              </a:spcBef>
+              <a:buFont typeface="Arial" panose="020B0604020202020204" pitchFamily="34" charset="0"/>
+              <a:buChar char="•"/>
+              <a:defRPr sz="2800" kern="1200">
+                <a:solidFill>
+                  <a:schemeClr val="tx1"/>
+                </a:solidFill>
+                <a:latin typeface="+mn-lt"/>
+                <a:ea typeface="+mn-ea"/>
+                <a:cs typeface="+mn-cs"/>
+              </a:defRPr>
+            </a:lvl1pPr>
+            <a:lvl2pPr marL="685800" indent="-228600" algn="l" defTabSz="914400" rtl="0" eaLnBrk="1" latinLnBrk="0" hangingPunct="1">
+              <a:lnSpc>
+                <a:spcPct val="90000"/>
+              </a:lnSpc>
+              <a:spcBef>
+                <a:spcPts val="500"/>
+              </a:spcBef>
+              <a:buFont typeface="Arial" panose="020B0604020202020204" pitchFamily="34" charset="0"/>
+              <a:buChar char="•"/>
+              <a:defRPr sz="2400" kern="1200">
+                <a:solidFill>
+                  <a:schemeClr val="tx1"/>
+                </a:solidFill>
+                <a:latin typeface="+mn-lt"/>
+                <a:ea typeface="+mn-ea"/>
+                <a:cs typeface="+mn-cs"/>
+              </a:defRPr>
+            </a:lvl2pPr>
+            <a:lvl3pPr marL="1143000" indent="-228600" algn="l" defTabSz="914400" rtl="0" eaLnBrk="1" latinLnBrk="0" hangingPunct="1">
+              <a:lnSpc>
+                <a:spcPct val="90000"/>
+              </a:lnSpc>
+              <a:spcBef>
+                <a:spcPts val="500"/>
+              </a:spcBef>
+              <a:buFont typeface="Arial" panose="020B0604020202020204" pitchFamily="34" charset="0"/>
+              <a:buChar char="•"/>
+              <a:defRPr sz="2000" kern="1200">
+                <a:solidFill>
+                  <a:schemeClr val="tx1"/>
+                </a:solidFill>
+                <a:latin typeface="+mn-lt"/>
+                <a:ea typeface="+mn-ea"/>
+                <a:cs typeface="+mn-cs"/>
+              </a:defRPr>
+            </a:lvl3pPr>
+            <a:lvl4pPr marL="1600200" indent="-228600" algn="l" defTabSz="914400" rtl="0" eaLnBrk="1" latinLnBrk="0" hangingPunct="1">
+              <a:lnSpc>
+                <a:spcPct val="90000"/>
+              </a:lnSpc>
+              <a:spcBef>
+                <a:spcPts val="500"/>
+              </a:spcBef>
+              <a:buFont typeface="Arial" panose="020B0604020202020204" pitchFamily="34" charset="0"/>
+              <a:buChar char="•"/>
+              <a:defRPr sz="1800" kern="1200">
+                <a:solidFill>
+                  <a:schemeClr val="tx1"/>
+                </a:solidFill>
+                <a:latin typeface="+mn-lt"/>
+                <a:ea typeface="+mn-ea"/>
+                <a:cs typeface="+mn-cs"/>
+              </a:defRPr>
+            </a:lvl4pPr>
+            <a:lvl5pPr marL="2057400" indent="-228600" algn="l" defTabSz="914400" rtl="0" eaLnBrk="1" latinLnBrk="0" hangingPunct="1">
+              <a:lnSpc>
+                <a:spcPct val="90000"/>
+              </a:lnSpc>
+              <a:spcBef>
+                <a:spcPts val="500"/>
+              </a:spcBef>
+              <a:buFont typeface="Arial" panose="020B0604020202020204" pitchFamily="34" charset="0"/>
+              <a:buChar char="•"/>
+              <a:defRPr sz="1800" kern="1200">
+                <a:solidFill>
+                  <a:schemeClr val="tx1"/>
+                </a:solidFill>
+                <a:latin typeface="+mn-lt"/>
+                <a:ea typeface="+mn-ea"/>
+                <a:cs typeface="+mn-cs"/>
+              </a:defRPr>
+            </a:lvl5pPr>
+            <a:lvl6pPr marL="2514600" indent="-228600" algn="l" defTabSz="914400" rtl="0" eaLnBrk="1" latinLnBrk="0" hangingPunct="1">
+              <a:lnSpc>
+                <a:spcPct val="90000"/>
+              </a:lnSpc>
+              <a:spcBef>
+                <a:spcPts val="500"/>
+              </a:spcBef>
+              <a:buFont typeface="Arial" panose="020B0604020202020204" pitchFamily="34" charset="0"/>
+              <a:buChar char="•"/>
+              <a:defRPr sz="1800" kern="1200">
+                <a:solidFill>
+                  <a:schemeClr val="tx1"/>
+                </a:solidFill>
+                <a:latin typeface="+mn-lt"/>
+                <a:ea typeface="+mn-ea"/>
+                <a:cs typeface="+mn-cs"/>
+              </a:defRPr>
+            </a:lvl6pPr>
+            <a:lvl7pPr marL="2971800" indent="-228600" algn="l" defTabSz="914400" rtl="0" eaLnBrk="1" latinLnBrk="0" hangingPunct="1">
+              <a:lnSpc>
+                <a:spcPct val="90000"/>
+              </a:lnSpc>
+              <a:spcBef>
+                <a:spcPts val="500"/>
+              </a:spcBef>
+              <a:buFont typeface="Arial" panose="020B0604020202020204" pitchFamily="34" charset="0"/>
+              <a:buChar char="•"/>
+              <a:defRPr sz="1800" kern="1200">
+                <a:solidFill>
+                  <a:schemeClr val="tx1"/>
+                </a:solidFill>
+                <a:latin typeface="+mn-lt"/>
+                <a:ea typeface="+mn-ea"/>
+                <a:cs typeface="+mn-cs"/>
+              </a:defRPr>
+            </a:lvl7pPr>
+            <a:lvl8pPr marL="3429000" indent="-228600" algn="l" defTabSz="914400" rtl="0" eaLnBrk="1" latinLnBrk="0" hangingPunct="1">
+              <a:lnSpc>
+                <a:spcPct val="90000"/>
+              </a:lnSpc>
+              <a:spcBef>
+                <a:spcPts val="500"/>
+              </a:spcBef>
+              <a:buFont typeface="Arial" panose="020B0604020202020204" pitchFamily="34" charset="0"/>
+              <a:buChar char="•"/>
+              <a:defRPr sz="1800" kern="1200">
+                <a:solidFill>
+                  <a:schemeClr val="tx1"/>
+                </a:solidFill>
+                <a:latin typeface="+mn-lt"/>
+                <a:ea typeface="+mn-ea"/>
+                <a:cs typeface="+mn-cs"/>
+              </a:defRPr>
+            </a:lvl8pPr>
+            <a:lvl9pPr marL="3886200" indent="-228600" algn="l" defTabSz="914400" rtl="0" eaLnBrk="1" latinLnBrk="0" hangingPunct="1">
+              <a:lnSpc>
+                <a:spcPct val="90000"/>
+              </a:lnSpc>
+              <a:spcBef>
+                <a:spcPts val="500"/>
+              </a:spcBef>
+              <a:buFont typeface="Arial" panose="020B0604020202020204" pitchFamily="34" charset="0"/>
+              <a:buChar char="•"/>
+              <a:defRPr sz="1800" kern="1200">
+                <a:solidFill>
+                  <a:schemeClr val="tx1"/>
+                </a:solidFill>
+                <a:latin typeface="+mn-lt"/>
+                <a:ea typeface="+mn-ea"/>
+                <a:cs typeface="+mn-cs"/>
+              </a:defRPr>
+            </a:lvl9pPr>
+          </a:lstStyle>
+          <a:p>
+            <a:pPr marL="0" indent="0">
+              <a:buNone/>
+            </a:pPr>
+            <a:r>
+              <a:rPr lang="en-US" sz="4400" dirty="0">
+                <a:solidFill>
+                  <a:srgbClr val="7FBA00"/>
+                </a:solidFill>
+                <a:latin typeface="Segoe UI Light" panose="020B0502040204020203" pitchFamily="34" charset="0"/>
+                <a:cs typeface="Segoe UI Light" panose="020B0502040204020203" pitchFamily="34" charset="0"/>
+              </a:rPr>
+              <a:t>Browser</a:t>
+            </a:r>
+          </a:p>
+        </p:txBody>
+      </p:sp>
+      <p:sp>
+        <p:nvSpPr>
+          <p:cNvPr id="8" name="Subtitle 2">
+            <a:extLst>
+              <a:ext uri="{FF2B5EF4-FFF2-40B4-BE49-F238E27FC236}">
+                <a16:creationId xmlns:a16="http://schemas.microsoft.com/office/drawing/2014/main" id="{47545AA5-525C-41F0-8B50-46CDA4FEFA15}"/>
+              </a:ext>
+            </a:extLst>
+          </p:cNvPr>
+          <p:cNvSpPr txBox="1">
+            <a:spLocks/>
+          </p:cNvSpPr>
+          <p:nvPr/>
+        </p:nvSpPr>
+        <p:spPr>
+          <a:xfrm>
+            <a:off x="404978" y="564457"/>
+            <a:ext cx="5230711" cy="783867"/>
+          </a:xfrm>
+          <a:prstGeom prst="rect">
+            <a:avLst/>
+          </a:prstGeom>
+        </p:spPr>
+        <p:txBody>
+          <a:bodyPr vert="horz" lIns="91440" tIns="45720" rIns="91440" bIns="45720" rtlCol="0">
+            <a:normAutofit fontScale="77500" lnSpcReduction="20000"/>
+          </a:bodyPr>
+          <a:lstStyle>
+            <a:lvl1pPr marL="0" indent="0" algn="ctr" defTabSz="914400" rtl="0" eaLnBrk="1" latinLnBrk="0" hangingPunct="1">
+              <a:lnSpc>
+                <a:spcPct val="90000"/>
+              </a:lnSpc>
+              <a:spcBef>
+                <a:spcPts val="1000"/>
+              </a:spcBef>
+              <a:buFont typeface="Arial" panose="020B0604020202020204" pitchFamily="34" charset="0"/>
+              <a:buNone/>
+              <a:defRPr sz="2400" kern="1200">
+                <a:solidFill>
+                  <a:schemeClr val="tx1"/>
+                </a:solidFill>
+                <a:latin typeface="+mn-lt"/>
+                <a:ea typeface="+mn-ea"/>
+                <a:cs typeface="+mn-cs"/>
+              </a:defRPr>
+            </a:lvl1pPr>
+            <a:lvl2pPr marL="457200" indent="0" algn="ctr" defTabSz="914400" rtl="0" eaLnBrk="1" latinLnBrk="0" hangingPunct="1">
+              <a:lnSpc>
+                <a:spcPct val="90000"/>
+              </a:lnSpc>
+              <a:spcBef>
+                <a:spcPts val="500"/>
+              </a:spcBef>
+              <a:buFont typeface="Arial" panose="020B0604020202020204" pitchFamily="34" charset="0"/>
+              <a:buNone/>
+              <a:defRPr sz="2000" kern="1200">
+                <a:solidFill>
+                  <a:schemeClr val="tx1"/>
+                </a:solidFill>
+                <a:latin typeface="+mn-lt"/>
+                <a:ea typeface="+mn-ea"/>
+                <a:cs typeface="+mn-cs"/>
+              </a:defRPr>
+            </a:lvl2pPr>
+            <a:lvl3pPr marL="914400" indent="0" algn="ctr" defTabSz="914400" rtl="0" eaLnBrk="1" latinLnBrk="0" hangingPunct="1">
+              <a:lnSpc>
+                <a:spcPct val="90000"/>
+              </a:lnSpc>
+              <a:spcBef>
+                <a:spcPts val="500"/>
+              </a:spcBef>
+              <a:buFont typeface="Arial" panose="020B0604020202020204" pitchFamily="34" charset="0"/>
+              <a:buNone/>
+              <a:defRPr sz="1800" kern="1200">
+                <a:solidFill>
+                  <a:schemeClr val="tx1"/>
+                </a:solidFill>
+                <a:latin typeface="+mn-lt"/>
+                <a:ea typeface="+mn-ea"/>
+                <a:cs typeface="+mn-cs"/>
+              </a:defRPr>
+            </a:lvl3pPr>
+            <a:lvl4pPr marL="1371600" indent="0" algn="ctr" defTabSz="914400" rtl="0" eaLnBrk="1" latinLnBrk="0" hangingPunct="1">
+              <a:lnSpc>
+                <a:spcPct val="90000"/>
+              </a:lnSpc>
+              <a:spcBef>
+                <a:spcPts val="500"/>
+              </a:spcBef>
+              <a:buFont typeface="Arial" panose="020B0604020202020204" pitchFamily="34" charset="0"/>
+              <a:buNone/>
+              <a:defRPr sz="1600" kern="1200">
+                <a:solidFill>
+                  <a:schemeClr val="tx1"/>
+                </a:solidFill>
+                <a:latin typeface="+mn-lt"/>
+                <a:ea typeface="+mn-ea"/>
+                <a:cs typeface="+mn-cs"/>
+              </a:defRPr>
+            </a:lvl4pPr>
+            <a:lvl5pPr marL="1828800" indent="0" algn="ctr" defTabSz="914400" rtl="0" eaLnBrk="1" latinLnBrk="0" hangingPunct="1">
+              <a:lnSpc>
+                <a:spcPct val="90000"/>
+              </a:lnSpc>
+              <a:spcBef>
+                <a:spcPts val="500"/>
+              </a:spcBef>
+              <a:buFont typeface="Arial" panose="020B0604020202020204" pitchFamily="34" charset="0"/>
+              <a:buNone/>
+              <a:defRPr sz="1600" kern="1200">
+                <a:solidFill>
+                  <a:schemeClr val="tx1"/>
+                </a:solidFill>
+                <a:latin typeface="+mn-lt"/>
+                <a:ea typeface="+mn-ea"/>
+                <a:cs typeface="+mn-cs"/>
+              </a:defRPr>
+            </a:lvl5pPr>
+            <a:lvl6pPr marL="2286000" indent="0" algn="ctr" defTabSz="914400" rtl="0" eaLnBrk="1" latinLnBrk="0" hangingPunct="1">
+              <a:lnSpc>
+                <a:spcPct val="90000"/>
+              </a:lnSpc>
+              <a:spcBef>
+                <a:spcPts val="500"/>
+              </a:spcBef>
+              <a:buFont typeface="Arial" panose="020B0604020202020204" pitchFamily="34" charset="0"/>
+              <a:buNone/>
+              <a:defRPr sz="1600" kern="1200">
+                <a:solidFill>
+                  <a:schemeClr val="tx1"/>
+                </a:solidFill>
+                <a:latin typeface="+mn-lt"/>
+                <a:ea typeface="+mn-ea"/>
+                <a:cs typeface="+mn-cs"/>
+              </a:defRPr>
+            </a:lvl6pPr>
+            <a:lvl7pPr marL="2743200" indent="0" algn="ctr" defTabSz="914400" rtl="0" eaLnBrk="1" latinLnBrk="0" hangingPunct="1">
+              <a:lnSpc>
+                <a:spcPct val="90000"/>
+              </a:lnSpc>
+              <a:spcBef>
+                <a:spcPts val="500"/>
+              </a:spcBef>
+              <a:buFont typeface="Arial" panose="020B0604020202020204" pitchFamily="34" charset="0"/>
+              <a:buNone/>
+              <a:defRPr sz="1600" kern="1200">
+                <a:solidFill>
+                  <a:schemeClr val="tx1"/>
+                </a:solidFill>
+                <a:latin typeface="+mn-lt"/>
+                <a:ea typeface="+mn-ea"/>
+                <a:cs typeface="+mn-cs"/>
+              </a:defRPr>
+            </a:lvl7pPr>
+            <a:lvl8pPr marL="3200400" indent="0" algn="ctr" defTabSz="914400" rtl="0" eaLnBrk="1" latinLnBrk="0" hangingPunct="1">
+              <a:lnSpc>
+                <a:spcPct val="90000"/>
+              </a:lnSpc>
+              <a:spcBef>
+                <a:spcPts val="500"/>
+              </a:spcBef>
+              <a:buFont typeface="Arial" panose="020B0604020202020204" pitchFamily="34" charset="0"/>
+              <a:buNone/>
+              <a:defRPr sz="1600" kern="1200">
+                <a:solidFill>
+                  <a:schemeClr val="tx1"/>
+                </a:solidFill>
+                <a:latin typeface="+mn-lt"/>
+                <a:ea typeface="+mn-ea"/>
+                <a:cs typeface="+mn-cs"/>
+              </a:defRPr>
+            </a:lvl8pPr>
+            <a:lvl9pPr marL="3657600" indent="0" algn="ctr" defTabSz="914400" rtl="0" eaLnBrk="1" latinLnBrk="0" hangingPunct="1">
+              <a:lnSpc>
+                <a:spcPct val="90000"/>
+              </a:lnSpc>
+              <a:spcBef>
+                <a:spcPts val="500"/>
+              </a:spcBef>
+              <a:buFont typeface="Arial" panose="020B0604020202020204" pitchFamily="34" charset="0"/>
+              <a:buNone/>
+              <a:defRPr sz="1600" kern="1200">
+                <a:solidFill>
+                  <a:schemeClr val="tx1"/>
+                </a:solidFill>
+                <a:latin typeface="+mn-lt"/>
+                <a:ea typeface="+mn-ea"/>
+                <a:cs typeface="+mn-cs"/>
+              </a:defRPr>
+            </a:lvl9pPr>
+          </a:lstStyle>
+          <a:p>
+            <a:pPr algn="l"/>
+            <a:r>
+              <a:rPr lang="en-US" sz="5400" dirty="0">
+                <a:latin typeface="Segoe UI Light" panose="020B0502040204020203" pitchFamily="34" charset="0"/>
+                <a:cs typeface="Segoe UI Light" panose="020B0502040204020203" pitchFamily="34" charset="0"/>
+              </a:rPr>
+              <a:t>HTTP 2.0 Server Push</a:t>
+            </a:r>
+          </a:p>
+        </p:txBody>
+      </p:sp>
+    </p:spTree>
+    <p:extLst>
+      <p:ext uri="{BB962C8B-B14F-4D97-AF65-F5344CB8AC3E}">
+        <p14:creationId xmlns:p14="http://schemas.microsoft.com/office/powerpoint/2010/main" val="265508803"/>
+      </p:ext>
+    </p:extLst>
+  </p:cSld>
+  <p:clrMapOvr>
+    <a:masterClrMapping/>
+  </p:clrMapOvr>
+</p:sld>
+</file>
+
+<file path=ppt/slides/slide3.xml><?xml version="1.0" encoding="utf-8"?>
+<p:sld xmlns:a="http://schemas.openxmlformats.org/drawingml/2006/main" xmlns:r="http://schemas.openxmlformats.org/officeDocument/2006/relationships" xmlns:p="http://schemas.openxmlformats.org/presentationml/2006/main">
+  <p:cSld>
+    <p:spTree>
+      <p:nvGrpSpPr>
+        <p:cNvPr id="1" name=""/>
+        <p:cNvGrpSpPr/>
+        <p:nvPr/>
+      </p:nvGrpSpPr>
+      <p:grpSpPr>
+        <a:xfrm>
+          <a:off x="0" y="0"/>
+          <a:ext cx="0" cy="0"/>
+          <a:chOff x="0" y="0"/>
+          <a:chExt cx="0" cy="0"/>
+        </a:xfrm>
+      </p:grpSpPr>
+      <p:pic>
+        <p:nvPicPr>
+          <p:cNvPr id="4" name="Picture 3">
+            <a:extLst>
+              <a:ext uri="{FF2B5EF4-FFF2-40B4-BE49-F238E27FC236}">
+                <a16:creationId xmlns:a16="http://schemas.microsoft.com/office/drawing/2014/main" id="{2E44B04D-E0E1-4761-9E3F-D54473366348}"/>
+              </a:ext>
+            </a:extLst>
+          </p:cNvPr>
+          <p:cNvPicPr>
+            <a:picLocks noChangeAspect="1"/>
+          </p:cNvPicPr>
+          <p:nvPr/>
+        </p:nvPicPr>
+        <p:blipFill>
+          <a:blip r:embed="rId2">
+            <a:extLst>
+              <a:ext uri="{28A0092B-C50C-407E-A947-70E740481C1C}">
+                <a14:useLocalDpi xmlns:a14="http://schemas.microsoft.com/office/drawing/2010/main" val="0"/>
+              </a:ext>
+            </a:extLst>
+          </a:blip>
+          <a:stretch>
+            <a:fillRect/>
+          </a:stretch>
+        </p:blipFill>
+        <p:spPr>
+          <a:xfrm>
+            <a:off x="9439352" y="2702605"/>
+            <a:ext cx="1191533" cy="1191533"/>
+          </a:xfrm>
+          <a:prstGeom prst="rect">
+            <a:avLst/>
+          </a:prstGeom>
+        </p:spPr>
+      </p:pic>
+      <p:pic>
+        <p:nvPicPr>
+          <p:cNvPr id="1026" name="Picture 2" descr="Image result for web server image">
+            <a:extLst>
+              <a:ext uri="{FF2B5EF4-FFF2-40B4-BE49-F238E27FC236}">
+                <a16:creationId xmlns:a16="http://schemas.microsoft.com/office/drawing/2014/main" id="{D181345F-3F9F-4DA0-AD9C-0B4B671040F8}"/>
+              </a:ext>
+            </a:extLst>
+          </p:cNvPr>
+          <p:cNvPicPr>
+            <a:picLocks noChangeAspect="1" noChangeArrowheads="1"/>
+          </p:cNvPicPr>
+          <p:nvPr/>
+        </p:nvPicPr>
+        <p:blipFill>
+          <a:blip r:embed="rId3">
+            <a:grayscl/>
+            <a:extLst>
+              <a:ext uri="{28A0092B-C50C-407E-A947-70E740481C1C}">
+                <a14:useLocalDpi xmlns:a14="http://schemas.microsoft.com/office/drawing/2010/main" val="0"/>
+              </a:ext>
+            </a:extLst>
+          </a:blip>
+          <a:srcRect/>
+          <a:stretch>
+            <a:fillRect/>
+          </a:stretch>
+        </p:blipFill>
+        <p:spPr bwMode="auto">
+          <a:xfrm>
+            <a:off x="584590" y="2570535"/>
+            <a:ext cx="2289238" cy="1716929"/>
+          </a:xfrm>
+          <a:prstGeom prst="rect">
+            <a:avLst/>
+          </a:prstGeom>
+          <a:noFill/>
+          <a:extLst>
+            <a:ext uri="{909E8E84-426E-40DD-AFC4-6F175D3DCCD1}">
+              <a14:hiddenFill xmlns:a14="http://schemas.microsoft.com/office/drawing/2010/main">
+                <a:solidFill>
+                  <a:srgbClr val="FFFFFF"/>
+                </a:solidFill>
+              </a14:hiddenFill>
+            </a:ext>
+          </a:extLst>
+        </p:spPr>
+      </p:pic>
+      <p:sp>
+        <p:nvSpPr>
+          <p:cNvPr id="6" name="Subtitle 2">
+            <a:extLst>
+              <a:ext uri="{FF2B5EF4-FFF2-40B4-BE49-F238E27FC236}">
+                <a16:creationId xmlns:a16="http://schemas.microsoft.com/office/drawing/2014/main" id="{AD7E004A-5E1D-4B05-841D-53D00E03AAAA}"/>
+              </a:ext>
+            </a:extLst>
+          </p:cNvPr>
+          <p:cNvSpPr txBox="1">
+            <a:spLocks/>
+          </p:cNvSpPr>
+          <p:nvPr/>
+        </p:nvSpPr>
+        <p:spPr>
+          <a:xfrm>
+            <a:off x="486626" y="2024744"/>
+            <a:ext cx="2723106" cy="545791"/>
+          </a:xfrm>
+          <a:prstGeom prst="rect">
+            <a:avLst/>
+          </a:prstGeom>
+        </p:spPr>
+        <p:txBody>
+          <a:bodyPr vert="horz" lIns="91440" tIns="45720" rIns="91440" bIns="45720" rtlCol="0">
+            <a:normAutofit fontScale="55000" lnSpcReduction="20000"/>
+          </a:bodyPr>
+          <a:lstStyle>
+            <a:lvl1pPr marL="0" indent="0" algn="ctr" defTabSz="914400" rtl="0" eaLnBrk="1" latinLnBrk="0" hangingPunct="1">
+              <a:lnSpc>
+                <a:spcPct val="90000"/>
+              </a:lnSpc>
+              <a:spcBef>
+                <a:spcPts val="1000"/>
+              </a:spcBef>
+              <a:buFont typeface="Arial" panose="020B0604020202020204" pitchFamily="34" charset="0"/>
+              <a:buNone/>
+              <a:defRPr sz="2400" kern="1200">
+                <a:solidFill>
+                  <a:schemeClr val="tx1"/>
+                </a:solidFill>
+                <a:latin typeface="+mn-lt"/>
+                <a:ea typeface="+mn-ea"/>
+                <a:cs typeface="+mn-cs"/>
+              </a:defRPr>
+            </a:lvl1pPr>
+            <a:lvl2pPr marL="457200" indent="0" algn="ctr" defTabSz="914400" rtl="0" eaLnBrk="1" latinLnBrk="0" hangingPunct="1">
+              <a:lnSpc>
+                <a:spcPct val="90000"/>
+              </a:lnSpc>
+              <a:spcBef>
+                <a:spcPts val="500"/>
+              </a:spcBef>
+              <a:buFont typeface="Arial" panose="020B0604020202020204" pitchFamily="34" charset="0"/>
+              <a:buNone/>
+              <a:defRPr sz="2000" kern="1200">
+                <a:solidFill>
+                  <a:schemeClr val="tx1"/>
+                </a:solidFill>
+                <a:latin typeface="+mn-lt"/>
+                <a:ea typeface="+mn-ea"/>
+                <a:cs typeface="+mn-cs"/>
+              </a:defRPr>
+            </a:lvl2pPr>
+            <a:lvl3pPr marL="914400" indent="0" algn="ctr" defTabSz="914400" rtl="0" eaLnBrk="1" latinLnBrk="0" hangingPunct="1">
+              <a:lnSpc>
+                <a:spcPct val="90000"/>
+              </a:lnSpc>
+              <a:spcBef>
+                <a:spcPts val="500"/>
+              </a:spcBef>
+              <a:buFont typeface="Arial" panose="020B0604020202020204" pitchFamily="34" charset="0"/>
+              <a:buNone/>
+              <a:defRPr sz="1800" kern="1200">
+                <a:solidFill>
+                  <a:schemeClr val="tx1"/>
+                </a:solidFill>
+                <a:latin typeface="+mn-lt"/>
+                <a:ea typeface="+mn-ea"/>
+                <a:cs typeface="+mn-cs"/>
+              </a:defRPr>
+            </a:lvl3pPr>
+            <a:lvl4pPr marL="1371600" indent="0" algn="ctr" defTabSz="914400" rtl="0" eaLnBrk="1" latinLnBrk="0" hangingPunct="1">
+              <a:lnSpc>
+                <a:spcPct val="90000"/>
+              </a:lnSpc>
+              <a:spcBef>
+                <a:spcPts val="500"/>
+              </a:spcBef>
+              <a:buFont typeface="Arial" panose="020B0604020202020204" pitchFamily="34" charset="0"/>
+              <a:buNone/>
+              <a:defRPr sz="1600" kern="1200">
+                <a:solidFill>
+                  <a:schemeClr val="tx1"/>
+                </a:solidFill>
+                <a:latin typeface="+mn-lt"/>
+                <a:ea typeface="+mn-ea"/>
+                <a:cs typeface="+mn-cs"/>
+              </a:defRPr>
+            </a:lvl4pPr>
+            <a:lvl5pPr marL="1828800" indent="0" algn="ctr" defTabSz="914400" rtl="0" eaLnBrk="1" latinLnBrk="0" hangingPunct="1">
+              <a:lnSpc>
+                <a:spcPct val="90000"/>
+              </a:lnSpc>
+              <a:spcBef>
+                <a:spcPts val="500"/>
+              </a:spcBef>
+              <a:buFont typeface="Arial" panose="020B0604020202020204" pitchFamily="34" charset="0"/>
+              <a:buNone/>
+              <a:defRPr sz="1600" kern="1200">
+                <a:solidFill>
+                  <a:schemeClr val="tx1"/>
+                </a:solidFill>
+                <a:latin typeface="+mn-lt"/>
+                <a:ea typeface="+mn-ea"/>
+                <a:cs typeface="+mn-cs"/>
+              </a:defRPr>
+            </a:lvl5pPr>
+            <a:lvl6pPr marL="2286000" indent="0" algn="ctr" defTabSz="914400" rtl="0" eaLnBrk="1" latinLnBrk="0" hangingPunct="1">
+              <a:lnSpc>
+                <a:spcPct val="90000"/>
+              </a:lnSpc>
+              <a:spcBef>
+                <a:spcPts val="500"/>
+              </a:spcBef>
+              <a:buFont typeface="Arial" panose="020B0604020202020204" pitchFamily="34" charset="0"/>
+              <a:buNone/>
+              <a:defRPr sz="1600" kern="1200">
+                <a:solidFill>
+                  <a:schemeClr val="tx1"/>
+                </a:solidFill>
+                <a:latin typeface="+mn-lt"/>
+                <a:ea typeface="+mn-ea"/>
+                <a:cs typeface="+mn-cs"/>
+              </a:defRPr>
+            </a:lvl6pPr>
+            <a:lvl7pPr marL="2743200" indent="0" algn="ctr" defTabSz="914400" rtl="0" eaLnBrk="1" latinLnBrk="0" hangingPunct="1">
+              <a:lnSpc>
+                <a:spcPct val="90000"/>
+              </a:lnSpc>
+              <a:spcBef>
+                <a:spcPts val="500"/>
+              </a:spcBef>
+              <a:buFont typeface="Arial" panose="020B0604020202020204" pitchFamily="34" charset="0"/>
+              <a:buNone/>
+              <a:defRPr sz="1600" kern="1200">
+                <a:solidFill>
+                  <a:schemeClr val="tx1"/>
+                </a:solidFill>
+                <a:latin typeface="+mn-lt"/>
+                <a:ea typeface="+mn-ea"/>
+                <a:cs typeface="+mn-cs"/>
+              </a:defRPr>
+            </a:lvl7pPr>
+            <a:lvl8pPr marL="3200400" indent="0" algn="ctr" defTabSz="914400" rtl="0" eaLnBrk="1" latinLnBrk="0" hangingPunct="1">
+              <a:lnSpc>
+                <a:spcPct val="90000"/>
+              </a:lnSpc>
+              <a:spcBef>
+                <a:spcPts val="500"/>
+              </a:spcBef>
+              <a:buFont typeface="Arial" panose="020B0604020202020204" pitchFamily="34" charset="0"/>
+              <a:buNone/>
+              <a:defRPr sz="1600" kern="1200">
+                <a:solidFill>
+                  <a:schemeClr val="tx1"/>
+                </a:solidFill>
+                <a:latin typeface="+mn-lt"/>
+                <a:ea typeface="+mn-ea"/>
+                <a:cs typeface="+mn-cs"/>
+              </a:defRPr>
+            </a:lvl8pPr>
+            <a:lvl9pPr marL="3657600" indent="0" algn="ctr" defTabSz="914400" rtl="0" eaLnBrk="1" latinLnBrk="0" hangingPunct="1">
+              <a:lnSpc>
+                <a:spcPct val="90000"/>
+              </a:lnSpc>
+              <a:spcBef>
+                <a:spcPts val="500"/>
+              </a:spcBef>
+              <a:buFont typeface="Arial" panose="020B0604020202020204" pitchFamily="34" charset="0"/>
+              <a:buNone/>
+              <a:defRPr sz="1600" kern="1200">
+                <a:solidFill>
+                  <a:schemeClr val="tx1"/>
+                </a:solidFill>
+                <a:latin typeface="+mn-lt"/>
+                <a:ea typeface="+mn-ea"/>
+                <a:cs typeface="+mn-cs"/>
+              </a:defRPr>
+            </a:lvl9pPr>
+          </a:lstStyle>
+          <a:p>
+            <a:pPr algn="l"/>
+            <a:r>
+              <a:rPr lang="en-US" sz="7200" dirty="0">
+                <a:solidFill>
+                  <a:srgbClr val="00B0F0"/>
+                </a:solidFill>
+                <a:latin typeface="Segoe UI Light" panose="020B0502040204020203" pitchFamily="34" charset="0"/>
+                <a:cs typeface="Segoe UI Light" panose="020B0502040204020203" pitchFamily="34" charset="0"/>
+              </a:rPr>
+              <a:t>Web Server</a:t>
+            </a:r>
+          </a:p>
+        </p:txBody>
+      </p:sp>
+      <p:sp>
+        <p:nvSpPr>
+          <p:cNvPr id="7" name="Subtitle 2">
+            <a:extLst>
+              <a:ext uri="{FF2B5EF4-FFF2-40B4-BE49-F238E27FC236}">
+                <a16:creationId xmlns:a16="http://schemas.microsoft.com/office/drawing/2014/main" id="{0B68BF50-6401-42DC-9401-6ABB540721CB}"/>
+              </a:ext>
+            </a:extLst>
+          </p:cNvPr>
+          <p:cNvSpPr txBox="1">
+            <a:spLocks/>
+          </p:cNvSpPr>
+          <p:nvPr/>
+        </p:nvSpPr>
+        <p:spPr>
+          <a:xfrm>
+            <a:off x="8982270" y="1924641"/>
+            <a:ext cx="2105698" cy="645894"/>
+          </a:xfrm>
+          <a:prstGeom prst="rect">
+            <a:avLst/>
+          </a:prstGeom>
+        </p:spPr>
+        <p:txBody>
+          <a:bodyPr vert="horz" lIns="91440" tIns="45720" rIns="91440" bIns="45720" rtlCol="0">
+            <a:noAutofit/>
+          </a:bodyPr>
+          <a:lstStyle>
+            <a:lvl1pPr marL="228600" indent="-228600" algn="l" defTabSz="914400" rtl="0" eaLnBrk="1" latinLnBrk="0" hangingPunct="1">
+              <a:lnSpc>
+                <a:spcPct val="90000"/>
+              </a:lnSpc>
+              <a:spcBef>
+                <a:spcPts val="1000"/>
+              </a:spcBef>
+              <a:buFont typeface="Arial" panose="020B0604020202020204" pitchFamily="34" charset="0"/>
+              <a:buChar char="•"/>
+              <a:defRPr sz="2800" kern="1200">
+                <a:solidFill>
+                  <a:schemeClr val="tx1"/>
+                </a:solidFill>
+                <a:latin typeface="+mn-lt"/>
+                <a:ea typeface="+mn-ea"/>
+                <a:cs typeface="+mn-cs"/>
+              </a:defRPr>
+            </a:lvl1pPr>
+            <a:lvl2pPr marL="685800" indent="-228600" algn="l" defTabSz="914400" rtl="0" eaLnBrk="1" latinLnBrk="0" hangingPunct="1">
+              <a:lnSpc>
+                <a:spcPct val="90000"/>
+              </a:lnSpc>
+              <a:spcBef>
+                <a:spcPts val="500"/>
+              </a:spcBef>
+              <a:buFont typeface="Arial" panose="020B0604020202020204" pitchFamily="34" charset="0"/>
+              <a:buChar char="•"/>
+              <a:defRPr sz="2400" kern="1200">
+                <a:solidFill>
+                  <a:schemeClr val="tx1"/>
+                </a:solidFill>
+                <a:latin typeface="+mn-lt"/>
+                <a:ea typeface="+mn-ea"/>
+                <a:cs typeface="+mn-cs"/>
+              </a:defRPr>
+            </a:lvl2pPr>
+            <a:lvl3pPr marL="1143000" indent="-228600" algn="l" defTabSz="914400" rtl="0" eaLnBrk="1" latinLnBrk="0" hangingPunct="1">
+              <a:lnSpc>
+                <a:spcPct val="90000"/>
+              </a:lnSpc>
+              <a:spcBef>
+                <a:spcPts val="500"/>
+              </a:spcBef>
+              <a:buFont typeface="Arial" panose="020B0604020202020204" pitchFamily="34" charset="0"/>
+              <a:buChar char="•"/>
+              <a:defRPr sz="2000" kern="1200">
+                <a:solidFill>
+                  <a:schemeClr val="tx1"/>
+                </a:solidFill>
+                <a:latin typeface="+mn-lt"/>
+                <a:ea typeface="+mn-ea"/>
+                <a:cs typeface="+mn-cs"/>
+              </a:defRPr>
+            </a:lvl3pPr>
+            <a:lvl4pPr marL="1600200" indent="-228600" algn="l" defTabSz="914400" rtl="0" eaLnBrk="1" latinLnBrk="0" hangingPunct="1">
+              <a:lnSpc>
+                <a:spcPct val="90000"/>
+              </a:lnSpc>
+              <a:spcBef>
+                <a:spcPts val="500"/>
+              </a:spcBef>
+              <a:buFont typeface="Arial" panose="020B0604020202020204" pitchFamily="34" charset="0"/>
+              <a:buChar char="•"/>
+              <a:defRPr sz="1800" kern="1200">
+                <a:solidFill>
+                  <a:schemeClr val="tx1"/>
+                </a:solidFill>
+                <a:latin typeface="+mn-lt"/>
+                <a:ea typeface="+mn-ea"/>
+                <a:cs typeface="+mn-cs"/>
+              </a:defRPr>
+            </a:lvl4pPr>
+            <a:lvl5pPr marL="2057400" indent="-228600" algn="l" defTabSz="914400" rtl="0" eaLnBrk="1" latinLnBrk="0" hangingPunct="1">
+              <a:lnSpc>
+                <a:spcPct val="90000"/>
+              </a:lnSpc>
+              <a:spcBef>
+                <a:spcPts val="500"/>
+              </a:spcBef>
+              <a:buFont typeface="Arial" panose="020B0604020202020204" pitchFamily="34" charset="0"/>
+              <a:buChar char="•"/>
+              <a:defRPr sz="1800" kern="1200">
+                <a:solidFill>
+                  <a:schemeClr val="tx1"/>
+                </a:solidFill>
+                <a:latin typeface="+mn-lt"/>
+                <a:ea typeface="+mn-ea"/>
+                <a:cs typeface="+mn-cs"/>
+              </a:defRPr>
+            </a:lvl5pPr>
+            <a:lvl6pPr marL="2514600" indent="-228600" algn="l" defTabSz="914400" rtl="0" eaLnBrk="1" latinLnBrk="0" hangingPunct="1">
+              <a:lnSpc>
+                <a:spcPct val="90000"/>
+              </a:lnSpc>
+              <a:spcBef>
+                <a:spcPts val="500"/>
+              </a:spcBef>
+              <a:buFont typeface="Arial" panose="020B0604020202020204" pitchFamily="34" charset="0"/>
+              <a:buChar char="•"/>
+              <a:defRPr sz="1800" kern="1200">
+                <a:solidFill>
+                  <a:schemeClr val="tx1"/>
+                </a:solidFill>
+                <a:latin typeface="+mn-lt"/>
+                <a:ea typeface="+mn-ea"/>
+                <a:cs typeface="+mn-cs"/>
+              </a:defRPr>
+            </a:lvl6pPr>
+            <a:lvl7pPr marL="2971800" indent="-228600" algn="l" defTabSz="914400" rtl="0" eaLnBrk="1" latinLnBrk="0" hangingPunct="1">
+              <a:lnSpc>
+                <a:spcPct val="90000"/>
+              </a:lnSpc>
+              <a:spcBef>
+                <a:spcPts val="500"/>
+              </a:spcBef>
+              <a:buFont typeface="Arial" panose="020B0604020202020204" pitchFamily="34" charset="0"/>
+              <a:buChar char="•"/>
+              <a:defRPr sz="1800" kern="1200">
+                <a:solidFill>
+                  <a:schemeClr val="tx1"/>
+                </a:solidFill>
+                <a:latin typeface="+mn-lt"/>
+                <a:ea typeface="+mn-ea"/>
+                <a:cs typeface="+mn-cs"/>
+              </a:defRPr>
+            </a:lvl7pPr>
+            <a:lvl8pPr marL="3429000" indent="-228600" algn="l" defTabSz="914400" rtl="0" eaLnBrk="1" latinLnBrk="0" hangingPunct="1">
+              <a:lnSpc>
+                <a:spcPct val="90000"/>
+              </a:lnSpc>
+              <a:spcBef>
+                <a:spcPts val="500"/>
+              </a:spcBef>
+              <a:buFont typeface="Arial" panose="020B0604020202020204" pitchFamily="34" charset="0"/>
+              <a:buChar char="•"/>
+              <a:defRPr sz="1800" kern="1200">
+                <a:solidFill>
+                  <a:schemeClr val="tx1"/>
+                </a:solidFill>
+                <a:latin typeface="+mn-lt"/>
+                <a:ea typeface="+mn-ea"/>
+                <a:cs typeface="+mn-cs"/>
+              </a:defRPr>
+            </a:lvl8pPr>
+            <a:lvl9pPr marL="3886200" indent="-228600" algn="l" defTabSz="914400" rtl="0" eaLnBrk="1" latinLnBrk="0" hangingPunct="1">
+              <a:lnSpc>
+                <a:spcPct val="90000"/>
+              </a:lnSpc>
+              <a:spcBef>
+                <a:spcPts val="500"/>
+              </a:spcBef>
+              <a:buFont typeface="Arial" panose="020B0604020202020204" pitchFamily="34" charset="0"/>
+              <a:buChar char="•"/>
+              <a:defRPr sz="1800" kern="1200">
+                <a:solidFill>
+                  <a:schemeClr val="tx1"/>
+                </a:solidFill>
+                <a:latin typeface="+mn-lt"/>
+                <a:ea typeface="+mn-ea"/>
+                <a:cs typeface="+mn-cs"/>
+              </a:defRPr>
+            </a:lvl9pPr>
+          </a:lstStyle>
+          <a:p>
+            <a:pPr marL="0" indent="0">
+              <a:buNone/>
+            </a:pPr>
+            <a:r>
+              <a:rPr lang="en-US" sz="4400" dirty="0">
+                <a:solidFill>
+                  <a:srgbClr val="7FBA00"/>
+                </a:solidFill>
+                <a:latin typeface="Segoe UI Light" panose="020B0502040204020203" pitchFamily="34" charset="0"/>
+                <a:cs typeface="Segoe UI Light" panose="020B0502040204020203" pitchFamily="34" charset="0"/>
+              </a:rPr>
+              <a:t>Browser</a:t>
+            </a:r>
+          </a:p>
+        </p:txBody>
+      </p:sp>
+      <p:sp>
+        <p:nvSpPr>
+          <p:cNvPr id="8" name="Subtitle 2">
+            <a:extLst>
+              <a:ext uri="{FF2B5EF4-FFF2-40B4-BE49-F238E27FC236}">
+                <a16:creationId xmlns:a16="http://schemas.microsoft.com/office/drawing/2014/main" id="{47545AA5-525C-41F0-8B50-46CDA4FEFA15}"/>
+              </a:ext>
+            </a:extLst>
+          </p:cNvPr>
+          <p:cNvSpPr txBox="1">
+            <a:spLocks/>
+          </p:cNvSpPr>
+          <p:nvPr/>
+        </p:nvSpPr>
+        <p:spPr>
+          <a:xfrm>
+            <a:off x="367656" y="307815"/>
+            <a:ext cx="4027062" cy="783867"/>
+          </a:xfrm>
+          <a:prstGeom prst="rect">
+            <a:avLst/>
+          </a:prstGeom>
+        </p:spPr>
+        <p:txBody>
+          <a:bodyPr vert="horz" lIns="91440" tIns="45720" rIns="91440" bIns="45720" rtlCol="0">
+            <a:normAutofit/>
+          </a:bodyPr>
+          <a:lstStyle>
+            <a:lvl1pPr marL="0" indent="0" algn="ctr" defTabSz="914400" rtl="0" eaLnBrk="1" latinLnBrk="0" hangingPunct="1">
+              <a:lnSpc>
+                <a:spcPct val="90000"/>
+              </a:lnSpc>
+              <a:spcBef>
+                <a:spcPts val="1000"/>
+              </a:spcBef>
+              <a:buFont typeface="Arial" panose="020B0604020202020204" pitchFamily="34" charset="0"/>
+              <a:buNone/>
+              <a:defRPr sz="2400" kern="1200">
+                <a:solidFill>
+                  <a:schemeClr val="tx1"/>
+                </a:solidFill>
+                <a:latin typeface="+mn-lt"/>
+                <a:ea typeface="+mn-ea"/>
+                <a:cs typeface="+mn-cs"/>
+              </a:defRPr>
+            </a:lvl1pPr>
+            <a:lvl2pPr marL="457200" indent="0" algn="ctr" defTabSz="914400" rtl="0" eaLnBrk="1" latinLnBrk="0" hangingPunct="1">
+              <a:lnSpc>
+                <a:spcPct val="90000"/>
+              </a:lnSpc>
+              <a:spcBef>
+                <a:spcPts val="500"/>
+              </a:spcBef>
+              <a:buFont typeface="Arial" panose="020B0604020202020204" pitchFamily="34" charset="0"/>
+              <a:buNone/>
+              <a:defRPr sz="2000" kern="1200">
+                <a:solidFill>
+                  <a:schemeClr val="tx1"/>
+                </a:solidFill>
+                <a:latin typeface="+mn-lt"/>
+                <a:ea typeface="+mn-ea"/>
+                <a:cs typeface="+mn-cs"/>
+              </a:defRPr>
+            </a:lvl2pPr>
+            <a:lvl3pPr marL="914400" indent="0" algn="ctr" defTabSz="914400" rtl="0" eaLnBrk="1" latinLnBrk="0" hangingPunct="1">
+              <a:lnSpc>
+                <a:spcPct val="90000"/>
+              </a:lnSpc>
+              <a:spcBef>
+                <a:spcPts val="500"/>
+              </a:spcBef>
+              <a:buFont typeface="Arial" panose="020B0604020202020204" pitchFamily="34" charset="0"/>
+              <a:buNone/>
+              <a:defRPr sz="1800" kern="1200">
+                <a:solidFill>
+                  <a:schemeClr val="tx1"/>
+                </a:solidFill>
+                <a:latin typeface="+mn-lt"/>
+                <a:ea typeface="+mn-ea"/>
+                <a:cs typeface="+mn-cs"/>
+              </a:defRPr>
+            </a:lvl3pPr>
+            <a:lvl4pPr marL="1371600" indent="0" algn="ctr" defTabSz="914400" rtl="0" eaLnBrk="1" latinLnBrk="0" hangingPunct="1">
+              <a:lnSpc>
+                <a:spcPct val="90000"/>
+              </a:lnSpc>
+              <a:spcBef>
+                <a:spcPts val="500"/>
+              </a:spcBef>
+              <a:buFont typeface="Arial" panose="020B0604020202020204" pitchFamily="34" charset="0"/>
+              <a:buNone/>
+              <a:defRPr sz="1600" kern="1200">
+                <a:solidFill>
+                  <a:schemeClr val="tx1"/>
+                </a:solidFill>
+                <a:latin typeface="+mn-lt"/>
+                <a:ea typeface="+mn-ea"/>
+                <a:cs typeface="+mn-cs"/>
+              </a:defRPr>
+            </a:lvl4pPr>
+            <a:lvl5pPr marL="1828800" indent="0" algn="ctr" defTabSz="914400" rtl="0" eaLnBrk="1" latinLnBrk="0" hangingPunct="1">
+              <a:lnSpc>
+                <a:spcPct val="90000"/>
+              </a:lnSpc>
+              <a:spcBef>
+                <a:spcPts val="500"/>
+              </a:spcBef>
+              <a:buFont typeface="Arial" panose="020B0604020202020204" pitchFamily="34" charset="0"/>
+              <a:buNone/>
+              <a:defRPr sz="1600" kern="1200">
+                <a:solidFill>
+                  <a:schemeClr val="tx1"/>
+                </a:solidFill>
+                <a:latin typeface="+mn-lt"/>
+                <a:ea typeface="+mn-ea"/>
+                <a:cs typeface="+mn-cs"/>
+              </a:defRPr>
+            </a:lvl5pPr>
+            <a:lvl6pPr marL="2286000" indent="0" algn="ctr" defTabSz="914400" rtl="0" eaLnBrk="1" latinLnBrk="0" hangingPunct="1">
+              <a:lnSpc>
+                <a:spcPct val="90000"/>
+              </a:lnSpc>
+              <a:spcBef>
+                <a:spcPts val="500"/>
+              </a:spcBef>
+              <a:buFont typeface="Arial" panose="020B0604020202020204" pitchFamily="34" charset="0"/>
+              <a:buNone/>
+              <a:defRPr sz="1600" kern="1200">
+                <a:solidFill>
+                  <a:schemeClr val="tx1"/>
+                </a:solidFill>
+                <a:latin typeface="+mn-lt"/>
+                <a:ea typeface="+mn-ea"/>
+                <a:cs typeface="+mn-cs"/>
+              </a:defRPr>
+            </a:lvl6pPr>
+            <a:lvl7pPr marL="2743200" indent="0" algn="ctr" defTabSz="914400" rtl="0" eaLnBrk="1" latinLnBrk="0" hangingPunct="1">
+              <a:lnSpc>
+                <a:spcPct val="90000"/>
+              </a:lnSpc>
+              <a:spcBef>
+                <a:spcPts val="500"/>
+              </a:spcBef>
+              <a:buFont typeface="Arial" panose="020B0604020202020204" pitchFamily="34" charset="0"/>
+              <a:buNone/>
+              <a:defRPr sz="1600" kern="1200">
+                <a:solidFill>
+                  <a:schemeClr val="tx1"/>
+                </a:solidFill>
+                <a:latin typeface="+mn-lt"/>
+                <a:ea typeface="+mn-ea"/>
+                <a:cs typeface="+mn-cs"/>
+              </a:defRPr>
+            </a:lvl7pPr>
+            <a:lvl8pPr marL="3200400" indent="0" algn="ctr" defTabSz="914400" rtl="0" eaLnBrk="1" latinLnBrk="0" hangingPunct="1">
+              <a:lnSpc>
+                <a:spcPct val="90000"/>
+              </a:lnSpc>
+              <a:spcBef>
+                <a:spcPts val="500"/>
+              </a:spcBef>
+              <a:buFont typeface="Arial" panose="020B0604020202020204" pitchFamily="34" charset="0"/>
+              <a:buNone/>
+              <a:defRPr sz="1600" kern="1200">
+                <a:solidFill>
+                  <a:schemeClr val="tx1"/>
+                </a:solidFill>
+                <a:latin typeface="+mn-lt"/>
+                <a:ea typeface="+mn-ea"/>
+                <a:cs typeface="+mn-cs"/>
+              </a:defRPr>
+            </a:lvl8pPr>
+            <a:lvl9pPr marL="3657600" indent="0" algn="ctr" defTabSz="914400" rtl="0" eaLnBrk="1" latinLnBrk="0" hangingPunct="1">
+              <a:lnSpc>
+                <a:spcPct val="90000"/>
+              </a:lnSpc>
+              <a:spcBef>
+                <a:spcPts val="500"/>
+              </a:spcBef>
+              <a:buFont typeface="Arial" panose="020B0604020202020204" pitchFamily="34" charset="0"/>
+              <a:buNone/>
+              <a:defRPr sz="1600" kern="1200">
+                <a:solidFill>
+                  <a:schemeClr val="tx1"/>
+                </a:solidFill>
+                <a:latin typeface="+mn-lt"/>
+                <a:ea typeface="+mn-ea"/>
+                <a:cs typeface="+mn-cs"/>
+              </a:defRPr>
+            </a:lvl9pPr>
+          </a:lstStyle>
+          <a:p>
+            <a:pPr algn="l"/>
+            <a:r>
+              <a:rPr lang="en-US" sz="4800" dirty="0">
+                <a:latin typeface="Segoe UI Light" panose="020B0502040204020203" pitchFamily="34" charset="0"/>
+                <a:cs typeface="Segoe UI Light" panose="020B0502040204020203" pitchFamily="34" charset="0"/>
+              </a:rPr>
+              <a:t>HTTP 1.1</a:t>
+            </a:r>
+          </a:p>
+        </p:txBody>
+      </p:sp>
+      <p:grpSp>
+        <p:nvGrpSpPr>
+          <p:cNvPr id="3" name="Group 2">
+            <a:extLst>
+              <a:ext uri="{FF2B5EF4-FFF2-40B4-BE49-F238E27FC236}">
+                <a16:creationId xmlns:a16="http://schemas.microsoft.com/office/drawing/2014/main" id="{2C7CA94A-D58D-428B-8398-339FB4396A7F}"/>
+              </a:ext>
+            </a:extLst>
+          </p:cNvPr>
+          <p:cNvGrpSpPr/>
+          <p:nvPr/>
+        </p:nvGrpSpPr>
+        <p:grpSpPr>
+          <a:xfrm>
+            <a:off x="3984169" y="2059228"/>
+            <a:ext cx="4437611" cy="345055"/>
+            <a:chOff x="3984169" y="2059228"/>
+            <a:chExt cx="4437611" cy="345055"/>
+          </a:xfrm>
+        </p:grpSpPr>
+        <p:sp>
+          <p:nvSpPr>
+            <p:cNvPr id="2" name="Arrow: Right 1">
+              <a:extLst>
+                <a:ext uri="{FF2B5EF4-FFF2-40B4-BE49-F238E27FC236}">
+                  <a16:creationId xmlns:a16="http://schemas.microsoft.com/office/drawing/2014/main" id="{37403348-26A1-43A4-A7E1-DD0C2E15CB58}"/>
+                </a:ext>
+              </a:extLst>
+            </p:cNvPr>
+            <p:cNvSpPr/>
+            <p:nvPr/>
+          </p:nvSpPr>
+          <p:spPr>
+            <a:xfrm flipH="1">
+              <a:off x="3984169" y="2190995"/>
+              <a:ext cx="4027061" cy="213288"/>
+            </a:xfrm>
+            <a:prstGeom prst="rightArrow">
+              <a:avLst/>
+            </a:prstGeom>
+            <a:solidFill>
+              <a:schemeClr val="tx1"/>
+            </a:solidFill>
+            <a:ln>
+              <a:solidFill>
+                <a:schemeClr val="tx1"/>
+              </a:solidFill>
+            </a:ln>
+          </p:spPr>
+          <p:style>
+            <a:lnRef idx="2">
+              <a:schemeClr val="accent1">
+                <a:shade val="50000"/>
+              </a:schemeClr>
+            </a:lnRef>
+            <a:fillRef idx="1">
+              <a:schemeClr val="accent1"/>
+            </a:fillRef>
+            <a:effectRef idx="0">
+              <a:schemeClr val="accent1"/>
+            </a:effectRef>
+            <a:fontRef idx="minor">
+              <a:schemeClr val="lt1"/>
+            </a:fontRef>
+          </p:style>
+          <p:txBody>
+            <a:bodyPr rtlCol="0" anchor="ctr"/>
+            <a:lstStyle/>
+            <a:p>
+              <a:pPr algn="ctr"/>
+              <a:endParaRPr lang="en-US"/>
+            </a:p>
+          </p:txBody>
+        </p:sp>
+        <p:sp>
+          <p:nvSpPr>
+            <p:cNvPr id="9" name="Subtitle 2">
+              <a:extLst>
+                <a:ext uri="{FF2B5EF4-FFF2-40B4-BE49-F238E27FC236}">
+                  <a16:creationId xmlns:a16="http://schemas.microsoft.com/office/drawing/2014/main" id="{1E43BEC4-9952-4C83-B0E9-E4A4391A529C}"/>
+                </a:ext>
+              </a:extLst>
+            </p:cNvPr>
+            <p:cNvSpPr txBox="1">
+              <a:spLocks/>
+            </p:cNvSpPr>
+            <p:nvPr/>
+          </p:nvSpPr>
+          <p:spPr>
+            <a:xfrm>
+              <a:off x="4394718" y="2059228"/>
+              <a:ext cx="4027062" cy="213289"/>
+            </a:xfrm>
+            <a:prstGeom prst="rect">
+              <a:avLst/>
+            </a:prstGeom>
+          </p:spPr>
+          <p:txBody>
+            <a:bodyPr vert="horz" lIns="91440" tIns="45720" rIns="91440" bIns="45720" rtlCol="0">
+              <a:normAutofit fontScale="92500" lnSpcReduction="20000"/>
+            </a:bodyPr>
+            <a:lstStyle>
+              <a:lvl1pPr marL="0" indent="0" algn="ctr" defTabSz="914400" rtl="0" eaLnBrk="1" latinLnBrk="0" hangingPunct="1">
+                <a:lnSpc>
+                  <a:spcPct val="90000"/>
+                </a:lnSpc>
+                <a:spcBef>
+                  <a:spcPts val="1000"/>
+                </a:spcBef>
+                <a:buFont typeface="Arial" panose="020B0604020202020204" pitchFamily="34" charset="0"/>
+                <a:buNone/>
+                <a:defRPr sz="2400" kern="1200">
+                  <a:solidFill>
+                    <a:schemeClr val="tx1"/>
+                  </a:solidFill>
+                  <a:latin typeface="+mn-lt"/>
+                  <a:ea typeface="+mn-ea"/>
+                  <a:cs typeface="+mn-cs"/>
+                </a:defRPr>
+              </a:lvl1pPr>
+              <a:lvl2pPr marL="457200" indent="0" algn="ctr" defTabSz="914400" rtl="0" eaLnBrk="1" latinLnBrk="0" hangingPunct="1">
+                <a:lnSpc>
+                  <a:spcPct val="90000"/>
+                </a:lnSpc>
+                <a:spcBef>
+                  <a:spcPts val="500"/>
+                </a:spcBef>
+                <a:buFont typeface="Arial" panose="020B0604020202020204" pitchFamily="34" charset="0"/>
+                <a:buNone/>
+                <a:defRPr sz="2000" kern="1200">
+                  <a:solidFill>
+                    <a:schemeClr val="tx1"/>
+                  </a:solidFill>
+                  <a:latin typeface="+mn-lt"/>
+                  <a:ea typeface="+mn-ea"/>
+                  <a:cs typeface="+mn-cs"/>
+                </a:defRPr>
+              </a:lvl2pPr>
+              <a:lvl3pPr marL="914400" indent="0" algn="ctr" defTabSz="914400" rtl="0" eaLnBrk="1" latinLnBrk="0" hangingPunct="1">
+                <a:lnSpc>
+                  <a:spcPct val="90000"/>
+                </a:lnSpc>
+                <a:spcBef>
+                  <a:spcPts val="500"/>
+                </a:spcBef>
+                <a:buFont typeface="Arial" panose="020B0604020202020204" pitchFamily="34" charset="0"/>
+                <a:buNone/>
+                <a:defRPr sz="1800" kern="1200">
+                  <a:solidFill>
+                    <a:schemeClr val="tx1"/>
+                  </a:solidFill>
+                  <a:latin typeface="+mn-lt"/>
+                  <a:ea typeface="+mn-ea"/>
+                  <a:cs typeface="+mn-cs"/>
+                </a:defRPr>
+              </a:lvl3pPr>
+              <a:lvl4pPr marL="1371600" indent="0" algn="ctr" defTabSz="914400" rtl="0" eaLnBrk="1" latinLnBrk="0" hangingPunct="1">
+                <a:lnSpc>
+                  <a:spcPct val="90000"/>
+                </a:lnSpc>
+                <a:spcBef>
+                  <a:spcPts val="500"/>
+                </a:spcBef>
+                <a:buFont typeface="Arial" panose="020B0604020202020204" pitchFamily="34" charset="0"/>
+                <a:buNone/>
+                <a:defRPr sz="1600" kern="1200">
+                  <a:solidFill>
+                    <a:schemeClr val="tx1"/>
+                  </a:solidFill>
+                  <a:latin typeface="+mn-lt"/>
+                  <a:ea typeface="+mn-ea"/>
+                  <a:cs typeface="+mn-cs"/>
+                </a:defRPr>
+              </a:lvl4pPr>
+              <a:lvl5pPr marL="1828800" indent="0" algn="ctr" defTabSz="914400" rtl="0" eaLnBrk="1" latinLnBrk="0" hangingPunct="1">
+                <a:lnSpc>
+                  <a:spcPct val="90000"/>
+                </a:lnSpc>
+                <a:spcBef>
+                  <a:spcPts val="500"/>
+                </a:spcBef>
+                <a:buFont typeface="Arial" panose="020B0604020202020204" pitchFamily="34" charset="0"/>
+                <a:buNone/>
+                <a:defRPr sz="1600" kern="1200">
+                  <a:solidFill>
+                    <a:schemeClr val="tx1"/>
+                  </a:solidFill>
+                  <a:latin typeface="+mn-lt"/>
+                  <a:ea typeface="+mn-ea"/>
+                  <a:cs typeface="+mn-cs"/>
+                </a:defRPr>
+              </a:lvl5pPr>
+              <a:lvl6pPr marL="2286000" indent="0" algn="ctr" defTabSz="914400" rtl="0" eaLnBrk="1" latinLnBrk="0" hangingPunct="1">
+                <a:lnSpc>
+                  <a:spcPct val="90000"/>
+                </a:lnSpc>
+                <a:spcBef>
+                  <a:spcPts val="500"/>
+                </a:spcBef>
+                <a:buFont typeface="Arial" panose="020B0604020202020204" pitchFamily="34" charset="0"/>
+                <a:buNone/>
+                <a:defRPr sz="1600" kern="1200">
+                  <a:solidFill>
+                    <a:schemeClr val="tx1"/>
+                  </a:solidFill>
+                  <a:latin typeface="+mn-lt"/>
+                  <a:ea typeface="+mn-ea"/>
+                  <a:cs typeface="+mn-cs"/>
+                </a:defRPr>
+              </a:lvl6pPr>
+              <a:lvl7pPr marL="2743200" indent="0" algn="ctr" defTabSz="914400" rtl="0" eaLnBrk="1" latinLnBrk="0" hangingPunct="1">
+                <a:lnSpc>
+                  <a:spcPct val="90000"/>
+                </a:lnSpc>
+                <a:spcBef>
+                  <a:spcPts val="500"/>
+                </a:spcBef>
+                <a:buFont typeface="Arial" panose="020B0604020202020204" pitchFamily="34" charset="0"/>
+                <a:buNone/>
+                <a:defRPr sz="1600" kern="1200">
+                  <a:solidFill>
+                    <a:schemeClr val="tx1"/>
+                  </a:solidFill>
+                  <a:latin typeface="+mn-lt"/>
+                  <a:ea typeface="+mn-ea"/>
+                  <a:cs typeface="+mn-cs"/>
+                </a:defRPr>
+              </a:lvl7pPr>
+              <a:lvl8pPr marL="3200400" indent="0" algn="ctr" defTabSz="914400" rtl="0" eaLnBrk="1" latinLnBrk="0" hangingPunct="1">
+                <a:lnSpc>
+                  <a:spcPct val="90000"/>
+                </a:lnSpc>
+                <a:spcBef>
+                  <a:spcPts val="500"/>
+                </a:spcBef>
+                <a:buFont typeface="Arial" panose="020B0604020202020204" pitchFamily="34" charset="0"/>
+                <a:buNone/>
+                <a:defRPr sz="1600" kern="1200">
+                  <a:solidFill>
+                    <a:schemeClr val="tx1"/>
+                  </a:solidFill>
+                  <a:latin typeface="+mn-lt"/>
+                  <a:ea typeface="+mn-ea"/>
+                  <a:cs typeface="+mn-cs"/>
+                </a:defRPr>
+              </a:lvl8pPr>
+              <a:lvl9pPr marL="3657600" indent="0" algn="ctr" defTabSz="914400" rtl="0" eaLnBrk="1" latinLnBrk="0" hangingPunct="1">
+                <a:lnSpc>
+                  <a:spcPct val="90000"/>
+                </a:lnSpc>
+                <a:spcBef>
+                  <a:spcPts val="500"/>
+                </a:spcBef>
+                <a:buFont typeface="Arial" panose="020B0604020202020204" pitchFamily="34" charset="0"/>
+                <a:buNone/>
+                <a:defRPr sz="1600" kern="1200">
+                  <a:solidFill>
+                    <a:schemeClr val="tx1"/>
+                  </a:solidFill>
+                  <a:latin typeface="+mn-lt"/>
+                  <a:ea typeface="+mn-ea"/>
+                  <a:cs typeface="+mn-cs"/>
+                </a:defRPr>
+              </a:lvl9pPr>
+            </a:lstStyle>
+            <a:p>
+              <a:pPr algn="l"/>
+              <a:r>
+                <a:rPr lang="en-US" sz="1200" dirty="0">
+                  <a:latin typeface="Segoe UI Light" panose="020B0502040204020203" pitchFamily="34" charset="0"/>
+                  <a:cs typeface="Segoe UI Light" panose="020B0502040204020203" pitchFamily="34" charset="0"/>
+                </a:rPr>
+                <a:t>Browser Sends HTTP Request for HTML Browser</a:t>
+              </a:r>
+            </a:p>
+          </p:txBody>
+        </p:sp>
+      </p:grpSp>
+      <p:grpSp>
+        <p:nvGrpSpPr>
+          <p:cNvPr id="15" name="Group 14">
+            <a:extLst>
+              <a:ext uri="{FF2B5EF4-FFF2-40B4-BE49-F238E27FC236}">
+                <a16:creationId xmlns:a16="http://schemas.microsoft.com/office/drawing/2014/main" id="{CD5D737B-DA8E-452A-86F7-C1FB16BD67CF}"/>
+              </a:ext>
+            </a:extLst>
+          </p:cNvPr>
+          <p:cNvGrpSpPr/>
+          <p:nvPr/>
+        </p:nvGrpSpPr>
+        <p:grpSpPr>
+          <a:xfrm>
+            <a:off x="3984169" y="2764247"/>
+            <a:ext cx="4437611" cy="319934"/>
+            <a:chOff x="3984169" y="2644946"/>
+            <a:chExt cx="4437611" cy="319934"/>
+          </a:xfrm>
+        </p:grpSpPr>
+        <p:sp>
+          <p:nvSpPr>
+            <p:cNvPr id="10" name="Arrow: Right 9">
+              <a:extLst>
+                <a:ext uri="{FF2B5EF4-FFF2-40B4-BE49-F238E27FC236}">
+                  <a16:creationId xmlns:a16="http://schemas.microsoft.com/office/drawing/2014/main" id="{CDAEF3CE-843F-4639-9F5C-06BC522D4AC1}"/>
+                </a:ext>
+              </a:extLst>
+            </p:cNvPr>
+            <p:cNvSpPr/>
+            <p:nvPr/>
+          </p:nvSpPr>
+          <p:spPr>
+            <a:xfrm>
+              <a:off x="3984169" y="2751591"/>
+              <a:ext cx="4027061" cy="213289"/>
+            </a:xfrm>
+            <a:prstGeom prst="rightArrow">
+              <a:avLst/>
+            </a:prstGeom>
+            <a:solidFill>
+              <a:schemeClr val="tx1"/>
+            </a:solidFill>
+            <a:ln>
+              <a:solidFill>
+                <a:schemeClr val="tx1"/>
+              </a:solidFill>
+            </a:ln>
+          </p:spPr>
+          <p:style>
+            <a:lnRef idx="2">
+              <a:schemeClr val="accent1">
+                <a:shade val="50000"/>
+              </a:schemeClr>
+            </a:lnRef>
+            <a:fillRef idx="1">
+              <a:schemeClr val="accent1"/>
+            </a:fillRef>
+            <a:effectRef idx="0">
+              <a:schemeClr val="accent1"/>
+            </a:effectRef>
+            <a:fontRef idx="minor">
+              <a:schemeClr val="lt1"/>
+            </a:fontRef>
+          </p:style>
+          <p:txBody>
+            <a:bodyPr rtlCol="0" anchor="ctr"/>
+            <a:lstStyle/>
+            <a:p>
+              <a:pPr algn="ctr"/>
+              <a:endParaRPr lang="en-US"/>
+            </a:p>
+          </p:txBody>
+        </p:sp>
+        <p:sp>
+          <p:nvSpPr>
+            <p:cNvPr id="11" name="Subtitle 2">
+              <a:extLst>
+                <a:ext uri="{FF2B5EF4-FFF2-40B4-BE49-F238E27FC236}">
+                  <a16:creationId xmlns:a16="http://schemas.microsoft.com/office/drawing/2014/main" id="{7C58B22E-CF97-43BE-956D-969EF8E58530}"/>
+                </a:ext>
+              </a:extLst>
+            </p:cNvPr>
+            <p:cNvSpPr txBox="1">
+              <a:spLocks/>
+            </p:cNvSpPr>
+            <p:nvPr/>
+          </p:nvSpPr>
+          <p:spPr>
+            <a:xfrm>
+              <a:off x="4394718" y="2644946"/>
+              <a:ext cx="4027062" cy="213289"/>
+            </a:xfrm>
+            <a:prstGeom prst="rect">
+              <a:avLst/>
+            </a:prstGeom>
+          </p:spPr>
+          <p:txBody>
+            <a:bodyPr vert="horz" lIns="91440" tIns="45720" rIns="91440" bIns="45720" rtlCol="0">
+              <a:normAutofit fontScale="92500" lnSpcReduction="20000"/>
+            </a:bodyPr>
+            <a:lstStyle>
+              <a:lvl1pPr marL="0" indent="0" algn="ctr" defTabSz="914400" rtl="0" eaLnBrk="1" latinLnBrk="0" hangingPunct="1">
+                <a:lnSpc>
+                  <a:spcPct val="90000"/>
+                </a:lnSpc>
+                <a:spcBef>
+                  <a:spcPts val="1000"/>
+                </a:spcBef>
+                <a:buFont typeface="Arial" panose="020B0604020202020204" pitchFamily="34" charset="0"/>
+                <a:buNone/>
+                <a:defRPr sz="2400" kern="1200">
+                  <a:solidFill>
+                    <a:schemeClr val="tx1"/>
+                  </a:solidFill>
+                  <a:latin typeface="+mn-lt"/>
+                  <a:ea typeface="+mn-ea"/>
+                  <a:cs typeface="+mn-cs"/>
+                </a:defRPr>
+              </a:lvl1pPr>
+              <a:lvl2pPr marL="457200" indent="0" algn="ctr" defTabSz="914400" rtl="0" eaLnBrk="1" latinLnBrk="0" hangingPunct="1">
+                <a:lnSpc>
+                  <a:spcPct val="90000"/>
+                </a:lnSpc>
+                <a:spcBef>
+                  <a:spcPts val="500"/>
+                </a:spcBef>
+                <a:buFont typeface="Arial" panose="020B0604020202020204" pitchFamily="34" charset="0"/>
+                <a:buNone/>
+                <a:defRPr sz="2000" kern="1200">
+                  <a:solidFill>
+                    <a:schemeClr val="tx1"/>
+                  </a:solidFill>
+                  <a:latin typeface="+mn-lt"/>
+                  <a:ea typeface="+mn-ea"/>
+                  <a:cs typeface="+mn-cs"/>
+                </a:defRPr>
+              </a:lvl2pPr>
+              <a:lvl3pPr marL="914400" indent="0" algn="ctr" defTabSz="914400" rtl="0" eaLnBrk="1" latinLnBrk="0" hangingPunct="1">
+                <a:lnSpc>
+                  <a:spcPct val="90000"/>
+                </a:lnSpc>
+                <a:spcBef>
+                  <a:spcPts val="500"/>
+                </a:spcBef>
+                <a:buFont typeface="Arial" panose="020B0604020202020204" pitchFamily="34" charset="0"/>
+                <a:buNone/>
+                <a:defRPr sz="1800" kern="1200">
+                  <a:solidFill>
+                    <a:schemeClr val="tx1"/>
+                  </a:solidFill>
+                  <a:latin typeface="+mn-lt"/>
+                  <a:ea typeface="+mn-ea"/>
+                  <a:cs typeface="+mn-cs"/>
+                </a:defRPr>
+              </a:lvl3pPr>
+              <a:lvl4pPr marL="1371600" indent="0" algn="ctr" defTabSz="914400" rtl="0" eaLnBrk="1" latinLnBrk="0" hangingPunct="1">
+                <a:lnSpc>
+                  <a:spcPct val="90000"/>
+                </a:lnSpc>
+                <a:spcBef>
+                  <a:spcPts val="500"/>
+                </a:spcBef>
+                <a:buFont typeface="Arial" panose="020B0604020202020204" pitchFamily="34" charset="0"/>
+                <a:buNone/>
+                <a:defRPr sz="1600" kern="1200">
+                  <a:solidFill>
+                    <a:schemeClr val="tx1"/>
+                  </a:solidFill>
+                  <a:latin typeface="+mn-lt"/>
+                  <a:ea typeface="+mn-ea"/>
+                  <a:cs typeface="+mn-cs"/>
+                </a:defRPr>
+              </a:lvl4pPr>
+              <a:lvl5pPr marL="1828800" indent="0" algn="ctr" defTabSz="914400" rtl="0" eaLnBrk="1" latinLnBrk="0" hangingPunct="1">
+                <a:lnSpc>
+                  <a:spcPct val="90000"/>
+                </a:lnSpc>
+                <a:spcBef>
+                  <a:spcPts val="500"/>
+                </a:spcBef>
+                <a:buFont typeface="Arial" panose="020B0604020202020204" pitchFamily="34" charset="0"/>
+                <a:buNone/>
+                <a:defRPr sz="1600" kern="1200">
+                  <a:solidFill>
+                    <a:schemeClr val="tx1"/>
+                  </a:solidFill>
+                  <a:latin typeface="+mn-lt"/>
+                  <a:ea typeface="+mn-ea"/>
+                  <a:cs typeface="+mn-cs"/>
+                </a:defRPr>
+              </a:lvl5pPr>
+              <a:lvl6pPr marL="2286000" indent="0" algn="ctr" defTabSz="914400" rtl="0" eaLnBrk="1" latinLnBrk="0" hangingPunct="1">
+                <a:lnSpc>
+                  <a:spcPct val="90000"/>
+                </a:lnSpc>
+                <a:spcBef>
+                  <a:spcPts val="500"/>
+                </a:spcBef>
+                <a:buFont typeface="Arial" panose="020B0604020202020204" pitchFamily="34" charset="0"/>
+                <a:buNone/>
+                <a:defRPr sz="1600" kern="1200">
+                  <a:solidFill>
+                    <a:schemeClr val="tx1"/>
+                  </a:solidFill>
+                  <a:latin typeface="+mn-lt"/>
+                  <a:ea typeface="+mn-ea"/>
+                  <a:cs typeface="+mn-cs"/>
+                </a:defRPr>
+              </a:lvl6pPr>
+              <a:lvl7pPr marL="2743200" indent="0" algn="ctr" defTabSz="914400" rtl="0" eaLnBrk="1" latinLnBrk="0" hangingPunct="1">
+                <a:lnSpc>
+                  <a:spcPct val="90000"/>
+                </a:lnSpc>
+                <a:spcBef>
+                  <a:spcPts val="500"/>
+                </a:spcBef>
+                <a:buFont typeface="Arial" panose="020B0604020202020204" pitchFamily="34" charset="0"/>
+                <a:buNone/>
+                <a:defRPr sz="1600" kern="1200">
+                  <a:solidFill>
+                    <a:schemeClr val="tx1"/>
+                  </a:solidFill>
+                  <a:latin typeface="+mn-lt"/>
+                  <a:ea typeface="+mn-ea"/>
+                  <a:cs typeface="+mn-cs"/>
+                </a:defRPr>
+              </a:lvl7pPr>
+              <a:lvl8pPr marL="3200400" indent="0" algn="ctr" defTabSz="914400" rtl="0" eaLnBrk="1" latinLnBrk="0" hangingPunct="1">
+                <a:lnSpc>
+                  <a:spcPct val="90000"/>
+                </a:lnSpc>
+                <a:spcBef>
+                  <a:spcPts val="500"/>
+                </a:spcBef>
+                <a:buFont typeface="Arial" panose="020B0604020202020204" pitchFamily="34" charset="0"/>
+                <a:buNone/>
+                <a:defRPr sz="1600" kern="1200">
+                  <a:solidFill>
+                    <a:schemeClr val="tx1"/>
+                  </a:solidFill>
+                  <a:latin typeface="+mn-lt"/>
+                  <a:ea typeface="+mn-ea"/>
+                  <a:cs typeface="+mn-cs"/>
+                </a:defRPr>
+              </a:lvl8pPr>
+              <a:lvl9pPr marL="3657600" indent="0" algn="ctr" defTabSz="914400" rtl="0" eaLnBrk="1" latinLnBrk="0" hangingPunct="1">
+                <a:lnSpc>
+                  <a:spcPct val="90000"/>
+                </a:lnSpc>
+                <a:spcBef>
+                  <a:spcPts val="500"/>
+                </a:spcBef>
+                <a:buFont typeface="Arial" panose="020B0604020202020204" pitchFamily="34" charset="0"/>
+                <a:buNone/>
+                <a:defRPr sz="1600" kern="1200">
+                  <a:solidFill>
+                    <a:schemeClr val="tx1"/>
+                  </a:solidFill>
+                  <a:latin typeface="+mn-lt"/>
+                  <a:ea typeface="+mn-ea"/>
+                  <a:cs typeface="+mn-cs"/>
+                </a:defRPr>
+              </a:lvl9pPr>
+            </a:lstStyle>
+            <a:p>
+              <a:pPr algn="l"/>
+              <a:r>
+                <a:rPr lang="en-US" sz="1200" dirty="0">
+                  <a:latin typeface="Segoe UI Light" panose="020B0502040204020203" pitchFamily="34" charset="0"/>
+                  <a:cs typeface="Segoe UI Light" panose="020B0502040204020203" pitchFamily="34" charset="0"/>
+                </a:rPr>
+                <a:t>Server Responds by providing HTML to browser</a:t>
+              </a:r>
+            </a:p>
+          </p:txBody>
+        </p:sp>
+      </p:grpSp>
+      <p:grpSp>
+        <p:nvGrpSpPr>
+          <p:cNvPr id="5" name="Group 4">
+            <a:extLst>
+              <a:ext uri="{FF2B5EF4-FFF2-40B4-BE49-F238E27FC236}">
+                <a16:creationId xmlns:a16="http://schemas.microsoft.com/office/drawing/2014/main" id="{429FA916-7700-4EF2-8850-523CA2A490D0}"/>
+              </a:ext>
+            </a:extLst>
+          </p:cNvPr>
+          <p:cNvGrpSpPr/>
+          <p:nvPr/>
+        </p:nvGrpSpPr>
+        <p:grpSpPr>
+          <a:xfrm>
+            <a:off x="3984168" y="3429000"/>
+            <a:ext cx="4027061" cy="362657"/>
+            <a:chOff x="3984169" y="3391001"/>
+            <a:chExt cx="4027061" cy="362657"/>
+          </a:xfrm>
+        </p:grpSpPr>
+        <p:sp>
+          <p:nvSpPr>
+            <p:cNvPr id="13" name="Arrow: Right 12">
+              <a:extLst>
+                <a:ext uri="{FF2B5EF4-FFF2-40B4-BE49-F238E27FC236}">
+                  <a16:creationId xmlns:a16="http://schemas.microsoft.com/office/drawing/2014/main" id="{90356BEC-ECA1-473D-9AB4-2012C58CA046}"/>
+                </a:ext>
+              </a:extLst>
+            </p:cNvPr>
+            <p:cNvSpPr/>
+            <p:nvPr/>
+          </p:nvSpPr>
+          <p:spPr>
+            <a:xfrm flipH="1">
+              <a:off x="3984169" y="3540370"/>
+              <a:ext cx="4027061" cy="213288"/>
+            </a:xfrm>
+            <a:prstGeom prst="rightArrow">
+              <a:avLst/>
+            </a:prstGeom>
+            <a:solidFill>
+              <a:schemeClr val="tx1"/>
+            </a:solidFill>
+            <a:ln>
+              <a:solidFill>
+                <a:schemeClr val="tx1"/>
+              </a:solidFill>
+            </a:ln>
+          </p:spPr>
+          <p:style>
+            <a:lnRef idx="2">
+              <a:schemeClr val="accent1">
+                <a:shade val="50000"/>
+              </a:schemeClr>
+            </a:lnRef>
+            <a:fillRef idx="1">
+              <a:schemeClr val="accent1"/>
+            </a:fillRef>
+            <a:effectRef idx="0">
+              <a:schemeClr val="accent1"/>
+            </a:effectRef>
+            <a:fontRef idx="minor">
+              <a:schemeClr val="lt1"/>
+            </a:fontRef>
+          </p:style>
+          <p:txBody>
+            <a:bodyPr rtlCol="0" anchor="ctr"/>
+            <a:lstStyle/>
+            <a:p>
+              <a:pPr algn="ctr"/>
+              <a:endParaRPr lang="en-US"/>
+            </a:p>
+          </p:txBody>
+        </p:sp>
+        <p:sp>
+          <p:nvSpPr>
+            <p:cNvPr id="14" name="Subtitle 2">
+              <a:extLst>
+                <a:ext uri="{FF2B5EF4-FFF2-40B4-BE49-F238E27FC236}">
+                  <a16:creationId xmlns:a16="http://schemas.microsoft.com/office/drawing/2014/main" id="{3714A78C-5634-429E-9C89-5AF8C5806864}"/>
+                </a:ext>
+              </a:extLst>
+            </p:cNvPr>
+            <p:cNvSpPr txBox="1">
+              <a:spLocks/>
+            </p:cNvSpPr>
+            <p:nvPr/>
+          </p:nvSpPr>
+          <p:spPr>
+            <a:xfrm>
+              <a:off x="4394718" y="3391001"/>
+              <a:ext cx="3274507" cy="362657"/>
+            </a:xfrm>
+            <a:prstGeom prst="rect">
+              <a:avLst/>
+            </a:prstGeom>
+          </p:spPr>
+          <p:txBody>
+            <a:bodyPr vert="horz" lIns="91440" tIns="45720" rIns="91440" bIns="45720" rtlCol="0">
+              <a:normAutofit/>
+            </a:bodyPr>
+            <a:lstStyle>
+              <a:lvl1pPr marL="0" indent="0" algn="ctr" defTabSz="914400" rtl="0" eaLnBrk="1" latinLnBrk="0" hangingPunct="1">
+                <a:lnSpc>
+                  <a:spcPct val="90000"/>
+                </a:lnSpc>
+                <a:spcBef>
+                  <a:spcPts val="1000"/>
+                </a:spcBef>
+                <a:buFont typeface="Arial" panose="020B0604020202020204" pitchFamily="34" charset="0"/>
+                <a:buNone/>
+                <a:defRPr sz="2400" kern="1200">
+                  <a:solidFill>
+                    <a:schemeClr val="tx1"/>
+                  </a:solidFill>
+                  <a:latin typeface="+mn-lt"/>
+                  <a:ea typeface="+mn-ea"/>
+                  <a:cs typeface="+mn-cs"/>
+                </a:defRPr>
+              </a:lvl1pPr>
+              <a:lvl2pPr marL="457200" indent="0" algn="ctr" defTabSz="914400" rtl="0" eaLnBrk="1" latinLnBrk="0" hangingPunct="1">
+                <a:lnSpc>
+                  <a:spcPct val="90000"/>
+                </a:lnSpc>
+                <a:spcBef>
+                  <a:spcPts val="500"/>
+                </a:spcBef>
+                <a:buFont typeface="Arial" panose="020B0604020202020204" pitchFamily="34" charset="0"/>
+                <a:buNone/>
+                <a:defRPr sz="2000" kern="1200">
+                  <a:solidFill>
+                    <a:schemeClr val="tx1"/>
+                  </a:solidFill>
+                  <a:latin typeface="+mn-lt"/>
+                  <a:ea typeface="+mn-ea"/>
+                  <a:cs typeface="+mn-cs"/>
+                </a:defRPr>
+              </a:lvl2pPr>
+              <a:lvl3pPr marL="914400" indent="0" algn="ctr" defTabSz="914400" rtl="0" eaLnBrk="1" latinLnBrk="0" hangingPunct="1">
+                <a:lnSpc>
+                  <a:spcPct val="90000"/>
+                </a:lnSpc>
+                <a:spcBef>
+                  <a:spcPts val="500"/>
+                </a:spcBef>
+                <a:buFont typeface="Arial" panose="020B0604020202020204" pitchFamily="34" charset="0"/>
+                <a:buNone/>
+                <a:defRPr sz="1800" kern="1200">
+                  <a:solidFill>
+                    <a:schemeClr val="tx1"/>
+                  </a:solidFill>
+                  <a:latin typeface="+mn-lt"/>
+                  <a:ea typeface="+mn-ea"/>
+                  <a:cs typeface="+mn-cs"/>
+                </a:defRPr>
+              </a:lvl3pPr>
+              <a:lvl4pPr marL="1371600" indent="0" algn="ctr" defTabSz="914400" rtl="0" eaLnBrk="1" latinLnBrk="0" hangingPunct="1">
+                <a:lnSpc>
+                  <a:spcPct val="90000"/>
+                </a:lnSpc>
+                <a:spcBef>
+                  <a:spcPts val="500"/>
+                </a:spcBef>
+                <a:buFont typeface="Arial" panose="020B0604020202020204" pitchFamily="34" charset="0"/>
+                <a:buNone/>
+                <a:defRPr sz="1600" kern="1200">
+                  <a:solidFill>
+                    <a:schemeClr val="tx1"/>
+                  </a:solidFill>
+                  <a:latin typeface="+mn-lt"/>
+                  <a:ea typeface="+mn-ea"/>
+                  <a:cs typeface="+mn-cs"/>
+                </a:defRPr>
+              </a:lvl4pPr>
+              <a:lvl5pPr marL="1828800" indent="0" algn="ctr" defTabSz="914400" rtl="0" eaLnBrk="1" latinLnBrk="0" hangingPunct="1">
+                <a:lnSpc>
+                  <a:spcPct val="90000"/>
+                </a:lnSpc>
+                <a:spcBef>
+                  <a:spcPts val="500"/>
+                </a:spcBef>
+                <a:buFont typeface="Arial" panose="020B0604020202020204" pitchFamily="34" charset="0"/>
+                <a:buNone/>
+                <a:defRPr sz="1600" kern="1200">
+                  <a:solidFill>
+                    <a:schemeClr val="tx1"/>
+                  </a:solidFill>
+                  <a:latin typeface="+mn-lt"/>
+                  <a:ea typeface="+mn-ea"/>
+                  <a:cs typeface="+mn-cs"/>
+                </a:defRPr>
+              </a:lvl5pPr>
+              <a:lvl6pPr marL="2286000" indent="0" algn="ctr" defTabSz="914400" rtl="0" eaLnBrk="1" latinLnBrk="0" hangingPunct="1">
+                <a:lnSpc>
+                  <a:spcPct val="90000"/>
+                </a:lnSpc>
+                <a:spcBef>
+                  <a:spcPts val="500"/>
+                </a:spcBef>
+                <a:buFont typeface="Arial" panose="020B0604020202020204" pitchFamily="34" charset="0"/>
+                <a:buNone/>
+                <a:defRPr sz="1600" kern="1200">
+                  <a:solidFill>
+                    <a:schemeClr val="tx1"/>
+                  </a:solidFill>
+                  <a:latin typeface="+mn-lt"/>
+                  <a:ea typeface="+mn-ea"/>
+                  <a:cs typeface="+mn-cs"/>
+                </a:defRPr>
+              </a:lvl6pPr>
+              <a:lvl7pPr marL="2743200" indent="0" algn="ctr" defTabSz="914400" rtl="0" eaLnBrk="1" latinLnBrk="0" hangingPunct="1">
+                <a:lnSpc>
+                  <a:spcPct val="90000"/>
+                </a:lnSpc>
+                <a:spcBef>
+                  <a:spcPts val="500"/>
+                </a:spcBef>
+                <a:buFont typeface="Arial" panose="020B0604020202020204" pitchFamily="34" charset="0"/>
+                <a:buNone/>
+                <a:defRPr sz="1600" kern="1200">
+                  <a:solidFill>
+                    <a:schemeClr val="tx1"/>
+                  </a:solidFill>
+                  <a:latin typeface="+mn-lt"/>
+                  <a:ea typeface="+mn-ea"/>
+                  <a:cs typeface="+mn-cs"/>
+                </a:defRPr>
+              </a:lvl7pPr>
+              <a:lvl8pPr marL="3200400" indent="0" algn="ctr" defTabSz="914400" rtl="0" eaLnBrk="1" latinLnBrk="0" hangingPunct="1">
+                <a:lnSpc>
+                  <a:spcPct val="90000"/>
+                </a:lnSpc>
+                <a:spcBef>
+                  <a:spcPts val="500"/>
+                </a:spcBef>
+                <a:buFont typeface="Arial" panose="020B0604020202020204" pitchFamily="34" charset="0"/>
+                <a:buNone/>
+                <a:defRPr sz="1600" kern="1200">
+                  <a:solidFill>
+                    <a:schemeClr val="tx1"/>
+                  </a:solidFill>
+                  <a:latin typeface="+mn-lt"/>
+                  <a:ea typeface="+mn-ea"/>
+                  <a:cs typeface="+mn-cs"/>
+                </a:defRPr>
+              </a:lvl8pPr>
+              <a:lvl9pPr marL="3657600" indent="0" algn="ctr" defTabSz="914400" rtl="0" eaLnBrk="1" latinLnBrk="0" hangingPunct="1">
+                <a:lnSpc>
+                  <a:spcPct val="90000"/>
+                </a:lnSpc>
+                <a:spcBef>
+                  <a:spcPts val="500"/>
+                </a:spcBef>
+                <a:buFont typeface="Arial" panose="020B0604020202020204" pitchFamily="34" charset="0"/>
+                <a:buNone/>
+                <a:defRPr sz="1600" kern="1200">
+                  <a:solidFill>
+                    <a:schemeClr val="tx1"/>
+                  </a:solidFill>
+                  <a:latin typeface="+mn-lt"/>
+                  <a:ea typeface="+mn-ea"/>
+                  <a:cs typeface="+mn-cs"/>
+                </a:defRPr>
+              </a:lvl9pPr>
+            </a:lstStyle>
+            <a:p>
+              <a:pPr algn="l"/>
+              <a:r>
+                <a:rPr lang="en-US" sz="1200" dirty="0">
+                  <a:latin typeface="Segoe UI Light" panose="020B0502040204020203" pitchFamily="34" charset="0"/>
+                  <a:cs typeface="Segoe UI Light" panose="020B0502040204020203" pitchFamily="34" charset="0"/>
+                </a:rPr>
+                <a:t>Browser reads HTML and sends more request</a:t>
+              </a:r>
+            </a:p>
+          </p:txBody>
+        </p:sp>
+      </p:grpSp>
+      <p:sp>
+        <p:nvSpPr>
+          <p:cNvPr id="19" name="Oval 18">
+            <a:extLst>
+              <a:ext uri="{FF2B5EF4-FFF2-40B4-BE49-F238E27FC236}">
+                <a16:creationId xmlns:a16="http://schemas.microsoft.com/office/drawing/2014/main" id="{33C401A6-754C-4EC6-BFD4-C6449A7F21FF}"/>
+              </a:ext>
+            </a:extLst>
+          </p:cNvPr>
+          <p:cNvSpPr/>
+          <p:nvPr/>
+        </p:nvSpPr>
+        <p:spPr>
+          <a:xfrm>
+            <a:off x="8086203" y="2117319"/>
+            <a:ext cx="410544" cy="343450"/>
+          </a:xfrm>
+          <a:prstGeom prst="ellipse">
+            <a:avLst/>
+          </a:prstGeom>
+          <a:solidFill>
+            <a:srgbClr val="00B0F0"/>
+          </a:solidFill>
+          <a:ln>
+            <a:solidFill>
+              <a:srgbClr val="00B0F0"/>
+            </a:solidFill>
+          </a:ln>
+        </p:spPr>
+        <p:style>
+          <a:lnRef idx="2">
+            <a:schemeClr val="accent1">
+              <a:shade val="50000"/>
+            </a:schemeClr>
+          </a:lnRef>
+          <a:fillRef idx="1">
+            <a:schemeClr val="accent1"/>
+          </a:fillRef>
+          <a:effectRef idx="0">
+            <a:schemeClr val="accent1"/>
+          </a:effectRef>
+          <a:fontRef idx="minor">
+            <a:schemeClr val="lt1"/>
+          </a:fontRef>
+        </p:style>
+        <p:txBody>
+          <a:bodyPr rtlCol="0" anchor="ctr"/>
+          <a:lstStyle/>
+          <a:p>
+            <a:pPr algn="ctr"/>
+            <a:r>
+              <a:rPr lang="en-US" dirty="0"/>
+              <a:t>1</a:t>
+            </a:r>
+          </a:p>
+        </p:txBody>
+      </p:sp>
+      <p:sp>
+        <p:nvSpPr>
+          <p:cNvPr id="24" name="Oval 23">
+            <a:extLst>
+              <a:ext uri="{FF2B5EF4-FFF2-40B4-BE49-F238E27FC236}">
+                <a16:creationId xmlns:a16="http://schemas.microsoft.com/office/drawing/2014/main" id="{F2B4F003-1FCC-4D47-A729-ACA59CA47C26}"/>
+              </a:ext>
+            </a:extLst>
+          </p:cNvPr>
+          <p:cNvSpPr/>
+          <p:nvPr/>
+        </p:nvSpPr>
+        <p:spPr>
+          <a:xfrm>
+            <a:off x="3480856" y="2777401"/>
+            <a:ext cx="410544" cy="343450"/>
+          </a:xfrm>
+          <a:prstGeom prst="ellipse">
+            <a:avLst/>
+          </a:prstGeom>
+          <a:solidFill>
+            <a:srgbClr val="00B0F0"/>
+          </a:solidFill>
+          <a:ln>
+            <a:solidFill>
+              <a:srgbClr val="00B0F0"/>
+            </a:solidFill>
+          </a:ln>
+        </p:spPr>
+        <p:style>
+          <a:lnRef idx="2">
+            <a:schemeClr val="accent1">
+              <a:shade val="50000"/>
+            </a:schemeClr>
+          </a:lnRef>
+          <a:fillRef idx="1">
+            <a:schemeClr val="accent1"/>
+          </a:fillRef>
+          <a:effectRef idx="0">
+            <a:schemeClr val="accent1"/>
+          </a:effectRef>
+          <a:fontRef idx="minor">
+            <a:schemeClr val="lt1"/>
+          </a:fontRef>
+        </p:style>
+        <p:txBody>
+          <a:bodyPr rtlCol="0" anchor="ctr"/>
+          <a:lstStyle/>
+          <a:p>
+            <a:pPr algn="ctr"/>
+            <a:r>
+              <a:rPr lang="en-US" dirty="0"/>
+              <a:t>2</a:t>
+            </a:r>
+          </a:p>
+        </p:txBody>
+      </p:sp>
+      <p:sp>
+        <p:nvSpPr>
+          <p:cNvPr id="25" name="Oval 24">
+            <a:extLst>
+              <a:ext uri="{FF2B5EF4-FFF2-40B4-BE49-F238E27FC236}">
+                <a16:creationId xmlns:a16="http://schemas.microsoft.com/office/drawing/2014/main" id="{9013B305-8B0F-416E-ADF4-6F46FACAD2CC}"/>
+              </a:ext>
+            </a:extLst>
+          </p:cNvPr>
+          <p:cNvSpPr/>
+          <p:nvPr/>
+        </p:nvSpPr>
+        <p:spPr>
+          <a:xfrm>
+            <a:off x="8086203" y="3513288"/>
+            <a:ext cx="410544" cy="343450"/>
+          </a:xfrm>
+          <a:prstGeom prst="ellipse">
+            <a:avLst/>
+          </a:prstGeom>
+          <a:solidFill>
+            <a:srgbClr val="00B0F0"/>
+          </a:solidFill>
+          <a:ln>
+            <a:solidFill>
+              <a:srgbClr val="00B0F0"/>
+            </a:solidFill>
+          </a:ln>
+        </p:spPr>
+        <p:style>
+          <a:lnRef idx="2">
+            <a:schemeClr val="accent1">
+              <a:shade val="50000"/>
+            </a:schemeClr>
+          </a:lnRef>
+          <a:fillRef idx="1">
+            <a:schemeClr val="accent1"/>
+          </a:fillRef>
+          <a:effectRef idx="0">
+            <a:schemeClr val="accent1"/>
+          </a:effectRef>
+          <a:fontRef idx="minor">
+            <a:schemeClr val="lt1"/>
+          </a:fontRef>
+        </p:style>
+        <p:txBody>
+          <a:bodyPr rtlCol="0" anchor="ctr"/>
+          <a:lstStyle/>
+          <a:p>
+            <a:pPr algn="ctr"/>
+            <a:r>
+              <a:rPr lang="en-US" dirty="0"/>
+              <a:t>3</a:t>
+            </a:r>
+          </a:p>
+        </p:txBody>
+      </p:sp>
+      <p:grpSp>
+        <p:nvGrpSpPr>
+          <p:cNvPr id="26" name="Group 25">
+            <a:extLst>
+              <a:ext uri="{FF2B5EF4-FFF2-40B4-BE49-F238E27FC236}">
+                <a16:creationId xmlns:a16="http://schemas.microsoft.com/office/drawing/2014/main" id="{6E67026D-C41E-41D8-A747-D6265ACD40C3}"/>
+              </a:ext>
+            </a:extLst>
+          </p:cNvPr>
+          <p:cNvGrpSpPr/>
+          <p:nvPr/>
+        </p:nvGrpSpPr>
+        <p:grpSpPr>
+          <a:xfrm>
+            <a:off x="3984169" y="4098300"/>
+            <a:ext cx="4437611" cy="319934"/>
+            <a:chOff x="3984169" y="2644946"/>
+            <a:chExt cx="4437611" cy="319934"/>
+          </a:xfrm>
+        </p:grpSpPr>
+        <p:sp>
+          <p:nvSpPr>
+            <p:cNvPr id="27" name="Arrow: Right 26">
+              <a:extLst>
+                <a:ext uri="{FF2B5EF4-FFF2-40B4-BE49-F238E27FC236}">
+                  <a16:creationId xmlns:a16="http://schemas.microsoft.com/office/drawing/2014/main" id="{461AD4BE-1794-4360-9164-AEE2A77DEABB}"/>
+                </a:ext>
+              </a:extLst>
+            </p:cNvPr>
+            <p:cNvSpPr/>
+            <p:nvPr/>
+          </p:nvSpPr>
+          <p:spPr>
+            <a:xfrm>
+              <a:off x="3984169" y="2751591"/>
+              <a:ext cx="4027061" cy="213289"/>
+            </a:xfrm>
+            <a:prstGeom prst="rightArrow">
+              <a:avLst/>
+            </a:prstGeom>
+            <a:solidFill>
+              <a:schemeClr val="tx1"/>
+            </a:solidFill>
+            <a:ln>
+              <a:solidFill>
+                <a:schemeClr val="tx1"/>
+              </a:solidFill>
+            </a:ln>
+          </p:spPr>
+          <p:style>
+            <a:lnRef idx="2">
+              <a:schemeClr val="accent1">
+                <a:shade val="50000"/>
+              </a:schemeClr>
+            </a:lnRef>
+            <a:fillRef idx="1">
+              <a:schemeClr val="accent1"/>
+            </a:fillRef>
+            <a:effectRef idx="0">
+              <a:schemeClr val="accent1"/>
+            </a:effectRef>
+            <a:fontRef idx="minor">
+              <a:schemeClr val="lt1"/>
+            </a:fontRef>
+          </p:style>
+          <p:txBody>
+            <a:bodyPr rtlCol="0" anchor="ctr"/>
+            <a:lstStyle/>
+            <a:p>
+              <a:pPr algn="ctr"/>
+              <a:endParaRPr lang="en-US"/>
+            </a:p>
+          </p:txBody>
+        </p:sp>
+        <p:sp>
+          <p:nvSpPr>
+            <p:cNvPr id="28" name="Subtitle 2">
+              <a:extLst>
+                <a:ext uri="{FF2B5EF4-FFF2-40B4-BE49-F238E27FC236}">
+                  <a16:creationId xmlns:a16="http://schemas.microsoft.com/office/drawing/2014/main" id="{8856A9F2-EE8C-424B-81A8-D8BB1B821062}"/>
+                </a:ext>
+              </a:extLst>
+            </p:cNvPr>
+            <p:cNvSpPr txBox="1">
+              <a:spLocks/>
+            </p:cNvSpPr>
+            <p:nvPr/>
+          </p:nvSpPr>
+          <p:spPr>
+            <a:xfrm>
+              <a:off x="4394718" y="2644946"/>
+              <a:ext cx="4027062" cy="213289"/>
+            </a:xfrm>
+            <a:prstGeom prst="rect">
+              <a:avLst/>
+            </a:prstGeom>
+          </p:spPr>
+          <p:txBody>
+            <a:bodyPr vert="horz" lIns="91440" tIns="45720" rIns="91440" bIns="45720" rtlCol="0">
+              <a:normAutofit fontScale="92500" lnSpcReduction="20000"/>
+            </a:bodyPr>
+            <a:lstStyle>
+              <a:lvl1pPr marL="0" indent="0" algn="ctr" defTabSz="914400" rtl="0" eaLnBrk="1" latinLnBrk="0" hangingPunct="1">
+                <a:lnSpc>
+                  <a:spcPct val="90000"/>
+                </a:lnSpc>
+                <a:spcBef>
+                  <a:spcPts val="1000"/>
+                </a:spcBef>
+                <a:buFont typeface="Arial" panose="020B0604020202020204" pitchFamily="34" charset="0"/>
+                <a:buNone/>
+                <a:defRPr sz="2400" kern="1200">
+                  <a:solidFill>
+                    <a:schemeClr val="tx1"/>
+                  </a:solidFill>
+                  <a:latin typeface="+mn-lt"/>
+                  <a:ea typeface="+mn-ea"/>
+                  <a:cs typeface="+mn-cs"/>
+                </a:defRPr>
+              </a:lvl1pPr>
+              <a:lvl2pPr marL="457200" indent="0" algn="ctr" defTabSz="914400" rtl="0" eaLnBrk="1" latinLnBrk="0" hangingPunct="1">
+                <a:lnSpc>
+                  <a:spcPct val="90000"/>
+                </a:lnSpc>
+                <a:spcBef>
+                  <a:spcPts val="500"/>
+                </a:spcBef>
+                <a:buFont typeface="Arial" panose="020B0604020202020204" pitchFamily="34" charset="0"/>
+                <a:buNone/>
+                <a:defRPr sz="2000" kern="1200">
+                  <a:solidFill>
+                    <a:schemeClr val="tx1"/>
+                  </a:solidFill>
+                  <a:latin typeface="+mn-lt"/>
+                  <a:ea typeface="+mn-ea"/>
+                  <a:cs typeface="+mn-cs"/>
+                </a:defRPr>
+              </a:lvl2pPr>
+              <a:lvl3pPr marL="914400" indent="0" algn="ctr" defTabSz="914400" rtl="0" eaLnBrk="1" latinLnBrk="0" hangingPunct="1">
+                <a:lnSpc>
+                  <a:spcPct val="90000"/>
+                </a:lnSpc>
+                <a:spcBef>
+                  <a:spcPts val="500"/>
+                </a:spcBef>
+                <a:buFont typeface="Arial" panose="020B0604020202020204" pitchFamily="34" charset="0"/>
+                <a:buNone/>
+                <a:defRPr sz="1800" kern="1200">
+                  <a:solidFill>
+                    <a:schemeClr val="tx1"/>
+                  </a:solidFill>
+                  <a:latin typeface="+mn-lt"/>
+                  <a:ea typeface="+mn-ea"/>
+                  <a:cs typeface="+mn-cs"/>
+                </a:defRPr>
+              </a:lvl3pPr>
+              <a:lvl4pPr marL="1371600" indent="0" algn="ctr" defTabSz="914400" rtl="0" eaLnBrk="1" latinLnBrk="0" hangingPunct="1">
+                <a:lnSpc>
+                  <a:spcPct val="90000"/>
+                </a:lnSpc>
+                <a:spcBef>
+                  <a:spcPts val="500"/>
+                </a:spcBef>
+                <a:buFont typeface="Arial" panose="020B0604020202020204" pitchFamily="34" charset="0"/>
+                <a:buNone/>
+                <a:defRPr sz="1600" kern="1200">
+                  <a:solidFill>
+                    <a:schemeClr val="tx1"/>
+                  </a:solidFill>
+                  <a:latin typeface="+mn-lt"/>
+                  <a:ea typeface="+mn-ea"/>
+                  <a:cs typeface="+mn-cs"/>
+                </a:defRPr>
+              </a:lvl4pPr>
+              <a:lvl5pPr marL="1828800" indent="0" algn="ctr" defTabSz="914400" rtl="0" eaLnBrk="1" latinLnBrk="0" hangingPunct="1">
+                <a:lnSpc>
+                  <a:spcPct val="90000"/>
+                </a:lnSpc>
+                <a:spcBef>
+                  <a:spcPts val="500"/>
+                </a:spcBef>
+                <a:buFont typeface="Arial" panose="020B0604020202020204" pitchFamily="34" charset="0"/>
+                <a:buNone/>
+                <a:defRPr sz="1600" kern="1200">
+                  <a:solidFill>
+                    <a:schemeClr val="tx1"/>
+                  </a:solidFill>
+                  <a:latin typeface="+mn-lt"/>
+                  <a:ea typeface="+mn-ea"/>
+                  <a:cs typeface="+mn-cs"/>
+                </a:defRPr>
+              </a:lvl5pPr>
+              <a:lvl6pPr marL="2286000" indent="0" algn="ctr" defTabSz="914400" rtl="0" eaLnBrk="1" latinLnBrk="0" hangingPunct="1">
+                <a:lnSpc>
+                  <a:spcPct val="90000"/>
+                </a:lnSpc>
+                <a:spcBef>
+                  <a:spcPts val="500"/>
+                </a:spcBef>
+                <a:buFont typeface="Arial" panose="020B0604020202020204" pitchFamily="34" charset="0"/>
+                <a:buNone/>
+                <a:defRPr sz="1600" kern="1200">
+                  <a:solidFill>
+                    <a:schemeClr val="tx1"/>
+                  </a:solidFill>
+                  <a:latin typeface="+mn-lt"/>
+                  <a:ea typeface="+mn-ea"/>
+                  <a:cs typeface="+mn-cs"/>
+                </a:defRPr>
+              </a:lvl6pPr>
+              <a:lvl7pPr marL="2743200" indent="0" algn="ctr" defTabSz="914400" rtl="0" eaLnBrk="1" latinLnBrk="0" hangingPunct="1">
+                <a:lnSpc>
+                  <a:spcPct val="90000"/>
+                </a:lnSpc>
+                <a:spcBef>
+                  <a:spcPts val="500"/>
+                </a:spcBef>
+                <a:buFont typeface="Arial" panose="020B0604020202020204" pitchFamily="34" charset="0"/>
+                <a:buNone/>
+                <a:defRPr sz="1600" kern="1200">
+                  <a:solidFill>
+                    <a:schemeClr val="tx1"/>
+                  </a:solidFill>
+                  <a:latin typeface="+mn-lt"/>
+                  <a:ea typeface="+mn-ea"/>
+                  <a:cs typeface="+mn-cs"/>
+                </a:defRPr>
+              </a:lvl7pPr>
+              <a:lvl8pPr marL="3200400" indent="0" algn="ctr" defTabSz="914400" rtl="0" eaLnBrk="1" latinLnBrk="0" hangingPunct="1">
+                <a:lnSpc>
+                  <a:spcPct val="90000"/>
+                </a:lnSpc>
+                <a:spcBef>
+                  <a:spcPts val="500"/>
+                </a:spcBef>
+                <a:buFont typeface="Arial" panose="020B0604020202020204" pitchFamily="34" charset="0"/>
+                <a:buNone/>
+                <a:defRPr sz="1600" kern="1200">
+                  <a:solidFill>
+                    <a:schemeClr val="tx1"/>
+                  </a:solidFill>
+                  <a:latin typeface="+mn-lt"/>
+                  <a:ea typeface="+mn-ea"/>
+                  <a:cs typeface="+mn-cs"/>
+                </a:defRPr>
+              </a:lvl8pPr>
+              <a:lvl9pPr marL="3657600" indent="0" algn="ctr" defTabSz="914400" rtl="0" eaLnBrk="1" latinLnBrk="0" hangingPunct="1">
+                <a:lnSpc>
+                  <a:spcPct val="90000"/>
+                </a:lnSpc>
+                <a:spcBef>
+                  <a:spcPts val="500"/>
+                </a:spcBef>
+                <a:buFont typeface="Arial" panose="020B0604020202020204" pitchFamily="34" charset="0"/>
+                <a:buNone/>
+                <a:defRPr sz="1600" kern="1200">
+                  <a:solidFill>
+                    <a:schemeClr val="tx1"/>
+                  </a:solidFill>
+                  <a:latin typeface="+mn-lt"/>
+                  <a:ea typeface="+mn-ea"/>
+                  <a:cs typeface="+mn-cs"/>
+                </a:defRPr>
+              </a:lvl9pPr>
+            </a:lstStyle>
+            <a:p>
+              <a:pPr algn="l"/>
+              <a:r>
+                <a:rPr lang="en-US" sz="1200" dirty="0">
+                  <a:latin typeface="Segoe UI Light" panose="020B0502040204020203" pitchFamily="34" charset="0"/>
+                  <a:cs typeface="Segoe UI Light" panose="020B0502040204020203" pitchFamily="34" charset="0"/>
+                </a:rPr>
+                <a:t>Sever sends additional resources (CSS, JS, Images)</a:t>
+              </a:r>
+            </a:p>
+          </p:txBody>
+        </p:sp>
+      </p:grpSp>
+      <p:sp>
+        <p:nvSpPr>
+          <p:cNvPr id="29" name="Oval 28">
+            <a:extLst>
+              <a:ext uri="{FF2B5EF4-FFF2-40B4-BE49-F238E27FC236}">
+                <a16:creationId xmlns:a16="http://schemas.microsoft.com/office/drawing/2014/main" id="{C71011B1-D8EB-4C90-8BCD-27DAFC5438CC}"/>
+              </a:ext>
+            </a:extLst>
+          </p:cNvPr>
+          <p:cNvSpPr/>
+          <p:nvPr/>
+        </p:nvSpPr>
+        <p:spPr>
+          <a:xfrm>
+            <a:off x="3471794" y="4115739"/>
+            <a:ext cx="410544" cy="343450"/>
+          </a:xfrm>
+          <a:prstGeom prst="ellipse">
+            <a:avLst/>
+          </a:prstGeom>
+          <a:solidFill>
+            <a:srgbClr val="00B0F0"/>
+          </a:solidFill>
+          <a:ln>
+            <a:solidFill>
+              <a:srgbClr val="00B0F0"/>
+            </a:solidFill>
+          </a:ln>
+        </p:spPr>
+        <p:style>
+          <a:lnRef idx="2">
+            <a:schemeClr val="accent1">
+              <a:shade val="50000"/>
+            </a:schemeClr>
+          </a:lnRef>
+          <a:fillRef idx="1">
+            <a:schemeClr val="accent1"/>
+          </a:fillRef>
+          <a:effectRef idx="0">
+            <a:schemeClr val="accent1"/>
+          </a:effectRef>
+          <a:fontRef idx="minor">
+            <a:schemeClr val="lt1"/>
+          </a:fontRef>
+        </p:style>
+        <p:txBody>
+          <a:bodyPr rtlCol="0" anchor="ctr"/>
+          <a:lstStyle/>
+          <a:p>
+            <a:pPr algn="ctr"/>
+            <a:r>
+              <a:rPr lang="en-US" dirty="0"/>
+              <a:t>4</a:t>
+            </a:r>
+          </a:p>
+        </p:txBody>
+      </p:sp>
+    </p:spTree>
+    <p:extLst>
+      <p:ext uri="{BB962C8B-B14F-4D97-AF65-F5344CB8AC3E}">
+        <p14:creationId xmlns:p14="http://schemas.microsoft.com/office/powerpoint/2010/main" val="4199927500"/>
+      </p:ext>
+    </p:extLst>
+  </p:cSld>
+  <p:clrMapOvr>
+    <a:masterClrMapping/>
+  </p:clrMapOvr>
+</p:sld>
+</file>
+
 <file path=ppt/theme/theme1.xml><?xml version="1.0" encoding="utf-8"?>
 <a:theme xmlns:a="http://schemas.openxmlformats.org/drawingml/2006/main" name="Office Theme">
   <a:themeElements>

</xml_diff>

<commit_message>
-Updated HTTP 1.1 content and fix some issues
</commit_message>
<xml_diff>
--- a/HTTP2 Server Push/logo template.pptx
+++ b/HTTP2 Server Push/logo template.pptx
@@ -3977,7 +3977,7 @@
         </p:blipFill>
         <p:spPr>
           <a:xfrm>
-            <a:off x="8452169" y="3689310"/>
+            <a:off x="8421780" y="3177720"/>
             <a:ext cx="710436" cy="710436"/>
           </a:xfrm>
           <a:prstGeom prst="rect">
@@ -4015,7 +4015,7 @@
         </p:blipFill>
         <p:spPr bwMode="auto">
           <a:xfrm>
-            <a:off x="1980358" y="3479371"/>
+            <a:off x="1949969" y="2967781"/>
             <a:ext cx="1477898" cy="1108424"/>
           </a:xfrm>
           <a:prstGeom prst="rect">
@@ -4962,7 +4962,7 @@
         </p:nvGrpSpPr>
         <p:grpSpPr>
           <a:xfrm>
-            <a:off x="3555829" y="3858981"/>
+            <a:off x="3525440" y="3347391"/>
             <a:ext cx="4530374" cy="428483"/>
             <a:chOff x="3480856" y="2692368"/>
             <a:chExt cx="4530374" cy="428483"/>
@@ -5333,7 +5333,7 @@
         </p:blipFill>
         <p:spPr bwMode="auto">
           <a:xfrm>
-            <a:off x="6360406" y="4336898"/>
+            <a:off x="6330017" y="3825308"/>
             <a:ext cx="581873" cy="820663"/>
           </a:xfrm>
           <a:prstGeom prst="rect">
@@ -5380,7 +5380,7 @@
         </p:blipFill>
         <p:spPr bwMode="auto">
           <a:xfrm>
-            <a:off x="5445759" y="4305458"/>
+            <a:off x="5415370" y="3793868"/>
             <a:ext cx="883545" cy="883545"/>
           </a:xfrm>
           <a:prstGeom prst="rect">
@@ -5427,7 +5427,7 @@
         </p:blipFill>
         <p:spPr bwMode="auto">
           <a:xfrm>
-            <a:off x="7050488" y="4333619"/>
+            <a:off x="7020099" y="3822029"/>
             <a:ext cx="820663" cy="820663"/>
           </a:xfrm>
           <a:prstGeom prst="rect">

</xml_diff>